<commit_message>
Add techbash slide to codemash 2026 deck
</commit_message>
<xml_diff>
--- a/2026/0115_CodeMash/Maui Toolkit/Create Multi-Platform Apps with .NET.pptx
+++ b/2026/0115_CodeMash/Maui Toolkit/Create Multi-Platform Apps with .NET.pptx
@@ -7,34 +7,35 @@
     <p:sldMasterId id="2147483703" r:id="rId3"/>
   </p:sldMasterIdLst>
   <p:notesMasterIdLst>
-    <p:notesMasterId r:id="rId26"/>
+    <p:notesMasterId r:id="rId27"/>
   </p:notesMasterIdLst>
   <p:handoutMasterIdLst>
-    <p:handoutMasterId r:id="rId27"/>
+    <p:handoutMasterId r:id="rId28"/>
   </p:handoutMasterIdLst>
   <p:sldIdLst>
     <p:sldId id="258" r:id="rId4"/>
     <p:sldId id="259" r:id="rId5"/>
     <p:sldId id="262" r:id="rId6"/>
-    <p:sldId id="264" r:id="rId7"/>
-    <p:sldId id="265" r:id="rId8"/>
-    <p:sldId id="266" r:id="rId9"/>
-    <p:sldId id="267" r:id="rId10"/>
-    <p:sldId id="269" r:id="rId11"/>
-    <p:sldId id="270" r:id="rId12"/>
-    <p:sldId id="272" r:id="rId13"/>
-    <p:sldId id="274" r:id="rId14"/>
-    <p:sldId id="277" r:id="rId15"/>
-    <p:sldId id="278" r:id="rId16"/>
-    <p:sldId id="279" r:id="rId17"/>
-    <p:sldId id="281" r:id="rId18"/>
-    <p:sldId id="283" r:id="rId19"/>
-    <p:sldId id="285" r:id="rId20"/>
-    <p:sldId id="286" r:id="rId21"/>
-    <p:sldId id="287" r:id="rId22"/>
-    <p:sldId id="290" r:id="rId23"/>
-    <p:sldId id="292" r:id="rId24"/>
-    <p:sldId id="291" r:id="rId25"/>
+    <p:sldId id="256" r:id="rId7"/>
+    <p:sldId id="264" r:id="rId8"/>
+    <p:sldId id="265" r:id="rId9"/>
+    <p:sldId id="266" r:id="rId10"/>
+    <p:sldId id="267" r:id="rId11"/>
+    <p:sldId id="269" r:id="rId12"/>
+    <p:sldId id="270" r:id="rId13"/>
+    <p:sldId id="272" r:id="rId14"/>
+    <p:sldId id="274" r:id="rId15"/>
+    <p:sldId id="277" r:id="rId16"/>
+    <p:sldId id="278" r:id="rId17"/>
+    <p:sldId id="279" r:id="rId18"/>
+    <p:sldId id="281" r:id="rId19"/>
+    <p:sldId id="283" r:id="rId20"/>
+    <p:sldId id="285" r:id="rId21"/>
+    <p:sldId id="286" r:id="rId22"/>
+    <p:sldId id="287" r:id="rId23"/>
+    <p:sldId id="290" r:id="rId24"/>
+    <p:sldId id="292" r:id="rId25"/>
+    <p:sldId id="291" r:id="rId26"/>
   </p:sldIdLst>
   <p:sldSz cx="9144000" cy="5143500" type="screen16x9"/>
   <p:notesSz cx="6858000" cy="9144000"/>
@@ -16427,7 +16428,7 @@
               <a:pPr>
                 <a:defRPr/>
               </a:pPr>
-              <a:t>12/27/2025</a:t>
+              <a:t>1/5/2026</a:t>
             </a:fld>
             <a:endParaRPr lang="en-US"/>
           </a:p>
@@ -16973,7 +16974,7 @@
               <a:pPr>
                 <a:defRPr/>
               </a:pPr>
-              <a:t>21</a:t>
+              <a:t>22</a:t>
             </a:fld>
             <a:endParaRPr lang="en-US"/>
           </a:p>
@@ -17347,7 +17348,7 @@
               <a:pPr>
                 <a:defRPr/>
               </a:pPr>
-              <a:t>4</a:t>
+              <a:t>5</a:t>
             </a:fld>
             <a:endParaRPr lang="en-US"/>
           </a:p>
@@ -17457,7 +17458,7 @@
               <a:pPr>
                 <a:defRPr/>
               </a:pPr>
-              <a:t>5</a:t>
+              <a:t>6</a:t>
             </a:fld>
             <a:endParaRPr lang="en-US"/>
           </a:p>
@@ -17575,7 +17576,7 @@
               <a:pPr>
                 <a:defRPr/>
               </a:pPr>
-              <a:t>6</a:t>
+              <a:t>7</a:t>
             </a:fld>
             <a:endParaRPr lang="en-US"/>
           </a:p>
@@ -17668,7 +17669,7 @@
               <a:pPr>
                 <a:defRPr/>
               </a:pPr>
-              <a:t>7</a:t>
+              <a:t>8</a:t>
             </a:fld>
             <a:endParaRPr lang="en-US"/>
           </a:p>
@@ -17761,7 +17762,7 @@
               <a:pPr>
                 <a:defRPr/>
               </a:pPr>
-              <a:t>8</a:t>
+              <a:t>9</a:t>
             </a:fld>
             <a:endParaRPr lang="en-US"/>
           </a:p>
@@ -17854,7 +17855,7 @@
               <a:pPr>
                 <a:defRPr/>
               </a:pPr>
-              <a:t>9</a:t>
+              <a:t>10</a:t>
             </a:fld>
             <a:endParaRPr lang="en-US"/>
           </a:p>
@@ -18062,7 +18063,7 @@
               <a:pPr>
                 <a:defRPr/>
               </a:pPr>
-              <a:t>12/27/2025</a:t>
+              <a:t>1/5/2026</a:t>
             </a:fld>
             <a:endParaRPr lang="en-US"/>
           </a:p>
@@ -18219,7 +18220,7 @@
               <a:pPr>
                 <a:defRPr/>
               </a:pPr>
-              <a:t>12/27/2025</a:t>
+              <a:t>1/5/2026</a:t>
             </a:fld>
             <a:endParaRPr lang="en-US"/>
           </a:p>
@@ -18386,7 +18387,7 @@
               <a:pPr>
                 <a:defRPr/>
               </a:pPr>
-              <a:t>12/27/2025</a:t>
+              <a:t>1/5/2026</a:t>
             </a:fld>
             <a:endParaRPr lang="en-US"/>
           </a:p>
@@ -18616,7 +18617,7 @@
               <a:pPr>
                 <a:defRPr/>
               </a:pPr>
-              <a:t>12/27/2025</a:t>
+              <a:t>1/5/2026</a:t>
             </a:fld>
             <a:endParaRPr lang="en-US"/>
           </a:p>
@@ -18783,7 +18784,7 @@
               <a:pPr>
                 <a:defRPr/>
               </a:pPr>
-              <a:t>12/27/2025</a:t>
+              <a:t>1/5/2026</a:t>
             </a:fld>
             <a:endParaRPr lang="en-US" dirty="0"/>
           </a:p>
@@ -19017,7 +19018,7 @@
               <a:pPr>
                 <a:defRPr/>
               </a:pPr>
-              <a:t>12/27/2025</a:t>
+              <a:t>1/5/2026</a:t>
             </a:fld>
             <a:endParaRPr lang="en-US"/>
           </a:p>
@@ -19291,7 +19292,7 @@
               <a:pPr>
                 <a:defRPr/>
               </a:pPr>
-              <a:t>12/27/2025</a:t>
+              <a:t>1/5/2026</a:t>
             </a:fld>
             <a:endParaRPr lang="en-US"/>
           </a:p>
@@ -19704,7 +19705,7 @@
               <a:pPr>
                 <a:defRPr/>
               </a:pPr>
-              <a:t>12/27/2025</a:t>
+              <a:t>1/5/2026</a:t>
             </a:fld>
             <a:endParaRPr lang="en-US"/>
           </a:p>
@@ -19810,7 +19811,7 @@
               <a:pPr>
                 <a:defRPr/>
               </a:pPr>
-              <a:t>12/27/2025</a:t>
+              <a:t>1/5/2026</a:t>
             </a:fld>
             <a:endParaRPr lang="en-US"/>
           </a:p>
@@ -19894,7 +19895,7 @@
               <a:pPr>
                 <a:defRPr/>
               </a:pPr>
-              <a:t>12/27/2025</a:t>
+              <a:t>1/5/2026</a:t>
             </a:fld>
             <a:endParaRPr lang="en-US"/>
           </a:p>
@@ -20158,7 +20159,7 @@
               <a:pPr>
                 <a:defRPr/>
               </a:pPr>
-              <a:t>12/27/2025</a:t>
+              <a:t>1/5/2026</a:t>
             </a:fld>
             <a:endParaRPr lang="en-US"/>
           </a:p>
@@ -20323,7 +20324,7 @@
               <a:pPr>
                 <a:defRPr/>
               </a:pPr>
-              <a:t>12/27/2025</a:t>
+              <a:t>1/5/2026</a:t>
             </a:fld>
             <a:endParaRPr lang="en-US" dirty="0"/>
           </a:p>
@@ -20570,7 +20571,7 @@
               <a:pPr>
                 <a:defRPr/>
               </a:pPr>
-              <a:t>12/27/2025</a:t>
+              <a:t>1/5/2026</a:t>
             </a:fld>
             <a:endParaRPr lang="en-US"/>
           </a:p>
@@ -20727,7 +20728,7 @@
               <a:pPr>
                 <a:defRPr/>
               </a:pPr>
-              <a:t>12/27/2025</a:t>
+              <a:t>1/5/2026</a:t>
             </a:fld>
             <a:endParaRPr lang="en-US"/>
           </a:p>
@@ -20894,7 +20895,7 @@
               <a:pPr>
                 <a:defRPr/>
               </a:pPr>
-              <a:t>12/27/2025</a:t>
+              <a:t>1/5/2026</a:t>
             </a:fld>
             <a:endParaRPr lang="en-US"/>
           </a:p>
@@ -21079,7 +21080,7 @@
               <a:pPr>
                 <a:defRPr/>
               </a:pPr>
-              <a:t>12/27/2025</a:t>
+              <a:t>1/5/2026</a:t>
             </a:fld>
             <a:endParaRPr lang="en-US"/>
           </a:p>
@@ -21300,7 +21301,7 @@
               <a:pPr>
                 <a:defRPr/>
               </a:pPr>
-              <a:t>12/27/2025</a:t>
+              <a:t>1/5/2026</a:t>
             </a:fld>
             <a:endParaRPr lang="en-US"/>
           </a:p>
@@ -21589,7 +21590,7 @@
               <a:pPr>
                 <a:defRPr/>
               </a:pPr>
-              <a:t>12/27/2025</a:t>
+              <a:t>1/5/2026</a:t>
             </a:fld>
             <a:endParaRPr lang="en-US"/>
           </a:p>
@@ -21867,7 +21868,7 @@
               <a:pPr>
                 <a:defRPr/>
               </a:pPr>
-              <a:t>12/27/2025</a:t>
+              <a:t>1/5/2026</a:t>
             </a:fld>
             <a:endParaRPr lang="en-US"/>
           </a:p>
@@ -22293,7 +22294,7 @@
               <a:pPr>
                 <a:defRPr/>
               </a:pPr>
-              <a:t>12/27/2025</a:t>
+              <a:t>1/5/2026</a:t>
             </a:fld>
             <a:endParaRPr lang="en-US"/>
           </a:p>
@@ -22452,7 +22453,7 @@
               <a:pPr>
                 <a:defRPr/>
               </a:pPr>
-              <a:t>12/27/2025</a:t>
+              <a:t>1/5/2026</a:t>
             </a:fld>
             <a:endParaRPr lang="en-US"/>
           </a:p>
@@ -22588,7 +22589,7 @@
               <a:pPr>
                 <a:defRPr/>
               </a:pPr>
-              <a:t>12/27/2025</a:t>
+              <a:t>1/5/2026</a:t>
             </a:fld>
             <a:endParaRPr lang="en-US"/>
           </a:p>
@@ -22847,7 +22848,7 @@
               <a:pPr>
                 <a:defRPr/>
               </a:pPr>
-              <a:t>12/27/2025</a:t>
+              <a:t>1/5/2026</a:t>
             </a:fld>
             <a:endParaRPr lang="en-US"/>
           </a:p>
@@ -23083,7 +23084,7 @@
               <a:pPr>
                 <a:defRPr/>
               </a:pPr>
-              <a:t>12/27/2025</a:t>
+              <a:t>1/5/2026</a:t>
             </a:fld>
             <a:endParaRPr lang="en-US"/>
           </a:p>
@@ -23538,7 +23539,7 @@
               <a:pPr>
                 <a:defRPr/>
               </a:pPr>
-              <a:t>12/27/2025</a:t>
+              <a:t>1/5/2026</a:t>
             </a:fld>
             <a:endParaRPr lang="en-US"/>
           </a:p>
@@ -23754,7 +23755,7 @@
               <a:pPr>
                 <a:defRPr/>
               </a:pPr>
-              <a:t>12/27/2025</a:t>
+              <a:t>1/5/2026</a:t>
             </a:fld>
             <a:endParaRPr lang="en-US"/>
           </a:p>
@@ -23979,7 +23980,7 @@
               <a:pPr>
                 <a:defRPr/>
               </a:pPr>
-              <a:t>12/27/2025</a:t>
+              <a:t>1/5/2026</a:t>
             </a:fld>
             <a:endParaRPr lang="en-US"/>
           </a:p>
@@ -24309,7 +24310,7 @@
               <a:pPr>
                 <a:defRPr/>
               </a:pPr>
-              <a:t>12/27/2025</a:t>
+              <a:t>1/5/2026</a:t>
             </a:fld>
             <a:endParaRPr lang="en-US"/>
           </a:p>
@@ -24722,7 +24723,7 @@
               <a:pPr>
                 <a:defRPr/>
               </a:pPr>
-              <a:t>12/27/2025</a:t>
+              <a:t>1/5/2026</a:t>
             </a:fld>
             <a:endParaRPr lang="en-US"/>
           </a:p>
@@ -24828,7 +24829,7 @@
               <a:pPr>
                 <a:defRPr/>
               </a:pPr>
-              <a:t>12/27/2025</a:t>
+              <a:t>1/5/2026</a:t>
             </a:fld>
             <a:endParaRPr lang="en-US"/>
           </a:p>
@@ -24912,7 +24913,7 @@
               <a:pPr>
                 <a:defRPr/>
               </a:pPr>
-              <a:t>12/27/2025</a:t>
+              <a:t>1/5/2026</a:t>
             </a:fld>
             <a:endParaRPr lang="en-US"/>
           </a:p>
@@ -25176,7 +25177,7 @@
               <a:pPr>
                 <a:defRPr/>
               </a:pPr>
-              <a:t>12/27/2025</a:t>
+              <a:t>1/5/2026</a:t>
             </a:fld>
             <a:endParaRPr lang="en-US"/>
           </a:p>
@@ -25420,7 +25421,7 @@
               <a:pPr>
                 <a:defRPr/>
               </a:pPr>
-              <a:t>12/27/2025</a:t>
+              <a:t>1/5/2026</a:t>
             </a:fld>
             <a:endParaRPr lang="en-US"/>
           </a:p>
@@ -25653,7 +25654,7 @@
               <a:pPr>
                 <a:defRPr/>
               </a:pPr>
-              <a:t>12/27/2025</a:t>
+              <a:t>1/5/2026</a:t>
             </a:fld>
             <a:endParaRPr lang="en-US"/>
           </a:p>
@@ -26332,7 +26333,7 @@
               <a:pPr>
                 <a:defRPr/>
               </a:pPr>
-              <a:t>12/27/2025</a:t>
+              <a:t>1/5/2026</a:t>
             </a:fld>
             <a:endParaRPr lang="en-US"/>
           </a:p>
@@ -27059,7 +27060,7 @@
               <a:pPr>
                 <a:defRPr/>
               </a:pPr>
-              <a:t>12/27/2025</a:t>
+              <a:t>1/5/2026</a:t>
             </a:fld>
             <a:endParaRPr lang="en-US"/>
           </a:p>
@@ -28403,6 +28404,786 @@
 <file path=ppt/slides/slide10.xml><?xml version="1.0" encoding="utf-8"?>
 <p:sld xmlns:a="http://schemas.openxmlformats.org/drawingml/2006/main" xmlns:r="http://schemas.openxmlformats.org/officeDocument/2006/relationships" xmlns:p="http://schemas.openxmlformats.org/presentationml/2006/main">
   <p:cSld>
+    <p:bg>
+      <p:bgPr>
+        <a:solidFill>
+          <a:schemeClr val="bg1"/>
+        </a:solidFill>
+        <a:effectLst/>
+      </p:bgPr>
+    </p:bg>
+    <p:spTree>
+      <p:nvGrpSpPr>
+        <p:cNvPr id="1" name=""/>
+        <p:cNvGrpSpPr/>
+        <p:nvPr/>
+      </p:nvGrpSpPr>
+      <p:grpSpPr>
+        <a:xfrm>
+          <a:off x="0" y="0"/>
+          <a:ext cx="0" cy="0"/>
+          <a:chOff x="0" y="0"/>
+          <a:chExt cx="0" cy="0"/>
+        </a:xfrm>
+      </p:grpSpPr>
+      <p:sp useBgFill="1">
+        <p:nvSpPr>
+          <p:cNvPr id="16" name="Rectangle 15">
+            <a:extLst>
+              <a:ext uri="{FF2B5EF4-FFF2-40B4-BE49-F238E27FC236}">
+                <a16:creationId xmlns:a16="http://schemas.microsoft.com/office/drawing/2014/main" id="{C6870151-9189-4C3A-8379-EF3D95827A0A}"/>
+              </a:ext>
+              <a:ext uri="{C183D7F6-B498-43B3-948B-1728B52AA6E4}">
+                <adec:decorative xmlns:adec="http://schemas.microsoft.com/office/drawing/2017/decorative" val="1"/>
+              </a:ext>
+            </a:extLst>
+          </p:cNvPr>
+          <p:cNvSpPr>
+            <a:spLocks noGrp="1" noRot="1" noChangeAspect="1" noMove="1" noResize="1" noEditPoints="1" noAdjustHandles="1" noChangeArrowheads="1" noChangeShapeType="1" noTextEdit="1"/>
+          </p:cNvSpPr>
+          <p:nvPr>
+            <p:extLst>
+              <p:ext uri="{386F3935-93C4-4BCD-93E2-E3B085C9AB24}">
+                <p16:designElem xmlns:p16="http://schemas.microsoft.com/office/powerpoint/2015/main" val="1"/>
+              </p:ext>
+            </p:extLst>
+          </p:nvPr>
+        </p:nvSpPr>
+        <p:spPr>
+          <a:xfrm>
+            <a:off x="0" y="0"/>
+            <a:ext cx="9144000" cy="5143500"/>
+          </a:xfrm>
+          <a:prstGeom prst="rect">
+            <a:avLst/>
+          </a:prstGeom>
+          <a:ln>
+            <a:noFill/>
+          </a:ln>
+        </p:spPr>
+        <p:style>
+          <a:lnRef idx="2">
+            <a:schemeClr val="accent1">
+              <a:shade val="50000"/>
+            </a:schemeClr>
+          </a:lnRef>
+          <a:fillRef idx="1">
+            <a:schemeClr val="accent1"/>
+          </a:fillRef>
+          <a:effectRef idx="0">
+            <a:schemeClr val="accent1"/>
+          </a:effectRef>
+          <a:fontRef idx="minor">
+            <a:schemeClr val="lt1"/>
+          </a:fontRef>
+        </p:style>
+        <p:txBody>
+          <a:bodyPr rtlCol="0" anchor="ctr"/>
+          <a:lstStyle/>
+          <a:p>
+            <a:pPr algn="ctr"/>
+            <a:endParaRPr lang="en-US"/>
+          </a:p>
+        </p:txBody>
+      </p:sp>
+      <p:pic>
+        <p:nvPicPr>
+          <p:cNvPr id="18" name="Picture 17" descr="Periodic table illustration">
+            <a:extLst>
+              <a:ext uri="{FF2B5EF4-FFF2-40B4-BE49-F238E27FC236}">
+                <a16:creationId xmlns:a16="http://schemas.microsoft.com/office/drawing/2014/main" id="{D68061D6-DECB-3E54-19F7-38C42E4BE120}"/>
+              </a:ext>
+            </a:extLst>
+          </p:cNvPr>
+          <p:cNvPicPr>
+            <a:picLocks noChangeAspect="1"/>
+          </p:cNvPicPr>
+          <p:nvPr/>
+        </p:nvPicPr>
+        <p:blipFill>
+          <a:blip r:embed="rId3">
+            <a:alphaModFix amt="50000"/>
+            <a:grayscl/>
+          </a:blip>
+          <a:srcRect t="6787" r="-2" b="36960"/>
+          <a:stretch>
+            <a:fillRect/>
+          </a:stretch>
+        </p:blipFill>
+        <p:spPr>
+          <a:xfrm>
+            <a:off x="228" y="10"/>
+            <a:ext cx="9143772" cy="5143490"/>
+          </a:xfrm>
+          <a:prstGeom prst="rect">
+            <a:avLst/>
+          </a:prstGeom>
+        </p:spPr>
+      </p:pic>
+      <p:sp>
+        <p:nvSpPr>
+          <p:cNvPr id="20" name="Slide Number Placeholder 7">
+            <a:extLst>
+              <a:ext uri="{FF2B5EF4-FFF2-40B4-BE49-F238E27FC236}">
+                <a16:creationId xmlns:a16="http://schemas.microsoft.com/office/drawing/2014/main" id="{123EA69C-102A-4DD0-9547-05DCD271D159}"/>
+              </a:ext>
+              <a:ext uri="{C183D7F6-B498-43B3-948B-1728B52AA6E4}">
+                <adec:decorative xmlns:adec="http://schemas.microsoft.com/office/drawing/2017/decorative" val="1"/>
+              </a:ext>
+            </a:extLst>
+          </p:cNvPr>
+          <p:cNvSpPr txBox="1">
+            <a:spLocks noGrp="1" noRot="1" noChangeAspect="1" noMove="1" noResize="1" noEditPoints="1" noAdjustHandles="1" noChangeArrowheads="1" noChangeShapeType="1" noTextEdit="1"/>
+          </p:cNvSpPr>
+          <p:nvPr>
+            <p:extLst>
+              <p:ext uri="{386F3935-93C4-4BCD-93E2-E3B085C9AB24}">
+                <p16:designElem xmlns:p16="http://schemas.microsoft.com/office/powerpoint/2015/main" val="1"/>
+              </p:ext>
+            </p:extLst>
+          </p:nvPr>
+        </p:nvSpPr>
+        <p:spPr>
+          <a:xfrm>
+            <a:off x="2634225" y="332799"/>
+            <a:ext cx="608265" cy="377683"/>
+          </a:xfrm>
+          <a:prstGeom prst="rect">
+            <a:avLst/>
+          </a:prstGeom>
+        </p:spPr>
+        <p:txBody>
+          <a:bodyPr vert="horz" lIns="91440" tIns="45720" rIns="91440" bIns="45720" rtlCol="0" anchor="t"/>
+          <a:lstStyle>
+            <a:defPPr>
+              <a:defRPr lang="en-US"/>
+            </a:defPPr>
+            <a:lvl1pPr marL="0" algn="r" defTabSz="457200" rtl="0" eaLnBrk="1" latinLnBrk="0" hangingPunct="1">
+              <a:defRPr sz="2800" kern="1200">
+                <a:solidFill>
+                  <a:schemeClr val="accent1"/>
+                </a:solidFill>
+                <a:latin typeface="+mn-lt"/>
+                <a:ea typeface="+mn-ea"/>
+                <a:cs typeface="+mn-cs"/>
+              </a:defRPr>
+            </a:lvl1pPr>
+            <a:lvl2pPr marL="457200" algn="l" defTabSz="457200" rtl="0" eaLnBrk="1" latinLnBrk="0" hangingPunct="1">
+              <a:defRPr sz="1800" kern="1200">
+                <a:solidFill>
+                  <a:schemeClr val="tx1"/>
+                </a:solidFill>
+                <a:latin typeface="+mn-lt"/>
+                <a:ea typeface="+mn-ea"/>
+                <a:cs typeface="+mn-cs"/>
+              </a:defRPr>
+            </a:lvl2pPr>
+            <a:lvl3pPr marL="914400" algn="l" defTabSz="457200" rtl="0" eaLnBrk="1" latinLnBrk="0" hangingPunct="1">
+              <a:defRPr sz="1800" kern="1200">
+                <a:solidFill>
+                  <a:schemeClr val="tx1"/>
+                </a:solidFill>
+                <a:latin typeface="+mn-lt"/>
+                <a:ea typeface="+mn-ea"/>
+                <a:cs typeface="+mn-cs"/>
+              </a:defRPr>
+            </a:lvl3pPr>
+            <a:lvl4pPr marL="1371600" algn="l" defTabSz="457200" rtl="0" eaLnBrk="1" latinLnBrk="0" hangingPunct="1">
+              <a:defRPr sz="1800" kern="1200">
+                <a:solidFill>
+                  <a:schemeClr val="tx1"/>
+                </a:solidFill>
+                <a:latin typeface="+mn-lt"/>
+                <a:ea typeface="+mn-ea"/>
+                <a:cs typeface="+mn-cs"/>
+              </a:defRPr>
+            </a:lvl4pPr>
+            <a:lvl5pPr marL="1828800" algn="l" defTabSz="457200" rtl="0" eaLnBrk="1" latinLnBrk="0" hangingPunct="1">
+              <a:defRPr sz="1800" kern="1200">
+                <a:solidFill>
+                  <a:schemeClr val="tx1"/>
+                </a:solidFill>
+                <a:latin typeface="+mn-lt"/>
+                <a:ea typeface="+mn-ea"/>
+                <a:cs typeface="+mn-cs"/>
+              </a:defRPr>
+            </a:lvl5pPr>
+            <a:lvl6pPr marL="2286000" algn="l" defTabSz="457200" rtl="0" eaLnBrk="1" latinLnBrk="0" hangingPunct="1">
+              <a:defRPr sz="1800" kern="1200">
+                <a:solidFill>
+                  <a:schemeClr val="tx1"/>
+                </a:solidFill>
+                <a:latin typeface="+mn-lt"/>
+                <a:ea typeface="+mn-ea"/>
+                <a:cs typeface="+mn-cs"/>
+              </a:defRPr>
+            </a:lvl6pPr>
+            <a:lvl7pPr marL="2743200" algn="l" defTabSz="457200" rtl="0" eaLnBrk="1" latinLnBrk="0" hangingPunct="1">
+              <a:defRPr sz="1800" kern="1200">
+                <a:solidFill>
+                  <a:schemeClr val="tx1"/>
+                </a:solidFill>
+                <a:latin typeface="+mn-lt"/>
+                <a:ea typeface="+mn-ea"/>
+                <a:cs typeface="+mn-cs"/>
+              </a:defRPr>
+            </a:lvl7pPr>
+            <a:lvl8pPr marL="3200400" algn="l" defTabSz="457200" rtl="0" eaLnBrk="1" latinLnBrk="0" hangingPunct="1">
+              <a:defRPr sz="1800" kern="1200">
+                <a:solidFill>
+                  <a:schemeClr val="tx1"/>
+                </a:solidFill>
+                <a:latin typeface="+mn-lt"/>
+                <a:ea typeface="+mn-ea"/>
+                <a:cs typeface="+mn-cs"/>
+              </a:defRPr>
+            </a:lvl8pPr>
+            <a:lvl9pPr marL="3657600" algn="l" defTabSz="457200" rtl="0" eaLnBrk="1" latinLnBrk="0" hangingPunct="1">
+              <a:defRPr sz="1800" kern="1200">
+                <a:solidFill>
+                  <a:schemeClr val="tx1"/>
+                </a:solidFill>
+                <a:latin typeface="+mn-lt"/>
+                <a:ea typeface="+mn-ea"/>
+                <a:cs typeface="+mn-cs"/>
+              </a:defRPr>
+            </a:lvl9pPr>
+          </a:lstStyle>
+          <a:p>
+            <a:endParaRPr lang="en-US" dirty="0"/>
+          </a:p>
+        </p:txBody>
+      </p:sp>
+      <p:sp>
+        <p:nvSpPr>
+          <p:cNvPr id="21" name="Footer Placeholder 6">
+            <a:extLst>
+              <a:ext uri="{FF2B5EF4-FFF2-40B4-BE49-F238E27FC236}">
+                <a16:creationId xmlns:a16="http://schemas.microsoft.com/office/drawing/2014/main" id="{6A862265-5CA3-4C40-8582-7534C3B03C2A}"/>
+              </a:ext>
+              <a:ext uri="{C183D7F6-B498-43B3-948B-1728B52AA6E4}">
+                <adec:decorative xmlns:adec="http://schemas.microsoft.com/office/drawing/2017/decorative" val="1"/>
+              </a:ext>
+            </a:extLst>
+          </p:cNvPr>
+          <p:cNvSpPr txBox="1">
+            <a:spLocks noGrp="1" noRot="1" noChangeAspect="1" noMove="1" noResize="1" noEditPoints="1" noAdjustHandles="1" noChangeArrowheads="1" noChangeShapeType="1" noTextEdit="1"/>
+          </p:cNvSpPr>
+          <p:nvPr>
+            <p:extLst>
+              <p:ext uri="{386F3935-93C4-4BCD-93E2-E3B085C9AB24}">
+                <p16:designElem xmlns:p16="http://schemas.microsoft.com/office/powerpoint/2015/main" val="1"/>
+              </p:ext>
+            </p:extLst>
+          </p:nvPr>
+        </p:nvSpPr>
+        <p:spPr>
+          <a:xfrm>
+            <a:off x="3732477" y="405690"/>
+            <a:ext cx="3730436" cy="231901"/>
+          </a:xfrm>
+          <a:prstGeom prst="rect">
+            <a:avLst/>
+          </a:prstGeom>
+        </p:spPr>
+        <p:txBody>
+          <a:bodyPr vert="horz" lIns="91440" tIns="45720" rIns="91440" bIns="45720" rtlCol="0" anchor="ctr"/>
+          <a:lstStyle>
+            <a:defPPr>
+              <a:defRPr lang="en-US"/>
+            </a:defPPr>
+            <a:lvl1pPr marL="0" algn="l" defTabSz="457200" rtl="0" eaLnBrk="1" latinLnBrk="0" hangingPunct="1">
+              <a:defRPr sz="1200" kern="1200">
+                <a:solidFill>
+                  <a:schemeClr val="tx1">
+                    <a:tint val="75000"/>
+                  </a:schemeClr>
+                </a:solidFill>
+                <a:latin typeface="+mn-lt"/>
+                <a:ea typeface="+mn-ea"/>
+                <a:cs typeface="+mn-cs"/>
+              </a:defRPr>
+            </a:lvl1pPr>
+            <a:lvl2pPr marL="457200" algn="l" defTabSz="457200" rtl="0" eaLnBrk="1" latinLnBrk="0" hangingPunct="1">
+              <a:defRPr sz="1800" kern="1200">
+                <a:solidFill>
+                  <a:schemeClr val="tx1"/>
+                </a:solidFill>
+                <a:latin typeface="+mn-lt"/>
+                <a:ea typeface="+mn-ea"/>
+                <a:cs typeface="+mn-cs"/>
+              </a:defRPr>
+            </a:lvl2pPr>
+            <a:lvl3pPr marL="914400" algn="l" defTabSz="457200" rtl="0" eaLnBrk="1" latinLnBrk="0" hangingPunct="1">
+              <a:defRPr sz="1800" kern="1200">
+                <a:solidFill>
+                  <a:schemeClr val="tx1"/>
+                </a:solidFill>
+                <a:latin typeface="+mn-lt"/>
+                <a:ea typeface="+mn-ea"/>
+                <a:cs typeface="+mn-cs"/>
+              </a:defRPr>
+            </a:lvl3pPr>
+            <a:lvl4pPr marL="1371600" algn="l" defTabSz="457200" rtl="0" eaLnBrk="1" latinLnBrk="0" hangingPunct="1">
+              <a:defRPr sz="1800" kern="1200">
+                <a:solidFill>
+                  <a:schemeClr val="tx1"/>
+                </a:solidFill>
+                <a:latin typeface="+mn-lt"/>
+                <a:ea typeface="+mn-ea"/>
+                <a:cs typeface="+mn-cs"/>
+              </a:defRPr>
+            </a:lvl4pPr>
+            <a:lvl5pPr marL="1828800" algn="l" defTabSz="457200" rtl="0" eaLnBrk="1" latinLnBrk="0" hangingPunct="1">
+              <a:defRPr sz="1800" kern="1200">
+                <a:solidFill>
+                  <a:schemeClr val="tx1"/>
+                </a:solidFill>
+                <a:latin typeface="+mn-lt"/>
+                <a:ea typeface="+mn-ea"/>
+                <a:cs typeface="+mn-cs"/>
+              </a:defRPr>
+            </a:lvl5pPr>
+            <a:lvl6pPr marL="2286000" algn="l" defTabSz="457200" rtl="0" eaLnBrk="1" latinLnBrk="0" hangingPunct="1">
+              <a:defRPr sz="1800" kern="1200">
+                <a:solidFill>
+                  <a:schemeClr val="tx1"/>
+                </a:solidFill>
+                <a:latin typeface="+mn-lt"/>
+                <a:ea typeface="+mn-ea"/>
+                <a:cs typeface="+mn-cs"/>
+              </a:defRPr>
+            </a:lvl6pPr>
+            <a:lvl7pPr marL="2743200" algn="l" defTabSz="457200" rtl="0" eaLnBrk="1" latinLnBrk="0" hangingPunct="1">
+              <a:defRPr sz="1800" kern="1200">
+                <a:solidFill>
+                  <a:schemeClr val="tx1"/>
+                </a:solidFill>
+                <a:latin typeface="+mn-lt"/>
+                <a:ea typeface="+mn-ea"/>
+                <a:cs typeface="+mn-cs"/>
+              </a:defRPr>
+            </a:lvl7pPr>
+            <a:lvl8pPr marL="3200400" algn="l" defTabSz="457200" rtl="0" eaLnBrk="1" latinLnBrk="0" hangingPunct="1">
+              <a:defRPr sz="1800" kern="1200">
+                <a:solidFill>
+                  <a:schemeClr val="tx1"/>
+                </a:solidFill>
+                <a:latin typeface="+mn-lt"/>
+                <a:ea typeface="+mn-ea"/>
+                <a:cs typeface="+mn-cs"/>
+              </a:defRPr>
+            </a:lvl8pPr>
+            <a:lvl9pPr marL="3657600" algn="l" defTabSz="457200" rtl="0" eaLnBrk="1" latinLnBrk="0" hangingPunct="1">
+              <a:defRPr sz="1800" kern="1200">
+                <a:solidFill>
+                  <a:schemeClr val="tx1"/>
+                </a:solidFill>
+                <a:latin typeface="+mn-lt"/>
+                <a:ea typeface="+mn-ea"/>
+                <a:cs typeface="+mn-cs"/>
+              </a:defRPr>
+            </a:lvl9pPr>
+          </a:lstStyle>
+          <a:p>
+            <a:endParaRPr lang="en-US" dirty="0">
+              <a:solidFill>
+                <a:schemeClr val="tx1"/>
+              </a:solidFill>
+            </a:endParaRPr>
+          </a:p>
+        </p:txBody>
+      </p:sp>
+      <p:sp>
+        <p:nvSpPr>
+          <p:cNvPr id="15" name="Rectangle 14">
+            <a:extLst>
+              <a:ext uri="{FF2B5EF4-FFF2-40B4-BE49-F238E27FC236}">
+                <a16:creationId xmlns:a16="http://schemas.microsoft.com/office/drawing/2014/main" id="{600EF80B-0391-4082-9AF5-F15B091B4CE9}"/>
+              </a:ext>
+              <a:ext uri="{C183D7F6-B498-43B3-948B-1728B52AA6E4}">
+                <adec:decorative xmlns:adec="http://schemas.microsoft.com/office/drawing/2017/decorative" val="1"/>
+              </a:ext>
+            </a:extLst>
+          </p:cNvPr>
+          <p:cNvSpPr>
+            <a:spLocks noGrp="1" noRot="1" noChangeAspect="1" noMove="1" noResize="1" noEditPoints="1" noAdjustHandles="1" noChangeArrowheads="1" noChangeShapeType="1" noTextEdit="1"/>
+          </p:cNvSpPr>
+          <p:nvPr>
+            <p:extLst>
+              <p:ext uri="{386F3935-93C4-4BCD-93E2-E3B085C9AB24}">
+                <p16:designElem xmlns:p16="http://schemas.microsoft.com/office/powerpoint/2015/main" val="1"/>
+              </p:ext>
+            </p:extLst>
+          </p:nvPr>
+        </p:nvSpPr>
+        <p:spPr>
+          <a:xfrm>
+            <a:off x="0" y="895350"/>
+            <a:ext cx="9144000" cy="4248149"/>
+          </a:xfrm>
+          <a:prstGeom prst="rect">
+            <a:avLst/>
+          </a:prstGeom>
+          <a:gradFill flip="none" rotWithShape="1">
+            <a:gsLst>
+              <a:gs pos="0">
+                <a:schemeClr val="bg2">
+                  <a:lumMod val="87000"/>
+                  <a:alpha val="4000"/>
+                </a:schemeClr>
+              </a:gs>
+              <a:gs pos="100000">
+                <a:schemeClr val="bg2">
+                  <a:lumMod val="95000"/>
+                  <a:lumOff val="5000"/>
+                </a:schemeClr>
+              </a:gs>
+            </a:gsLst>
+            <a:lin ang="5400000" scaled="0"/>
+            <a:tileRect/>
+          </a:gradFill>
+          <a:ln>
+            <a:noFill/>
+          </a:ln>
+        </p:spPr>
+        <p:style>
+          <a:lnRef idx="2">
+            <a:schemeClr val="accent1">
+              <a:shade val="50000"/>
+            </a:schemeClr>
+          </a:lnRef>
+          <a:fillRef idx="1">
+            <a:schemeClr val="accent1"/>
+          </a:fillRef>
+          <a:effectRef idx="0">
+            <a:schemeClr val="accent1"/>
+          </a:effectRef>
+          <a:fontRef idx="minor">
+            <a:schemeClr val="lt1"/>
+          </a:fontRef>
+        </p:style>
+        <p:txBody>
+          <a:bodyPr/>
+          <a:lstStyle/>
+          <a:p>
+            <a:endParaRPr lang="en-US" dirty="0"/>
+          </a:p>
+        </p:txBody>
+      </p:sp>
+      <p:sp>
+        <p:nvSpPr>
+          <p:cNvPr id="2" name="Title 1">
+            <a:extLst>
+              <a:ext uri="{FF2B5EF4-FFF2-40B4-BE49-F238E27FC236}">
+                <a16:creationId xmlns:a16="http://schemas.microsoft.com/office/drawing/2014/main" id="{90CC6BE5-276A-02D2-3E28-30E82DE7723D}"/>
+              </a:ext>
+            </a:extLst>
+          </p:cNvPr>
+          <p:cNvSpPr>
+            <a:spLocks noGrp="1"/>
+          </p:cNvSpPr>
+          <p:nvPr>
+            <p:ph type="title"/>
+          </p:nvPr>
+        </p:nvSpPr>
+        <p:spPr>
+          <a:xfrm>
+            <a:off x="847703" y="895350"/>
+            <a:ext cx="2394787" cy="3524250"/>
+          </a:xfrm>
+        </p:spPr>
+        <p:txBody>
+          <a:bodyPr anchor="ctr">
+            <a:normAutofit/>
+          </a:bodyPr>
+          <a:lstStyle/>
+          <a:p>
+            <a:r>
+              <a:rPr lang="en-US" dirty="0"/>
+              <a:t>Productivity Tips</a:t>
+            </a:r>
+          </a:p>
+        </p:txBody>
+      </p:sp>
+      <p:cxnSp>
+        <p:nvCxnSpPr>
+          <p:cNvPr id="17" name="Straight Connector 16">
+            <a:extLst>
+              <a:ext uri="{FF2B5EF4-FFF2-40B4-BE49-F238E27FC236}">
+                <a16:creationId xmlns:a16="http://schemas.microsoft.com/office/drawing/2014/main" id="{D33AC32D-5F44-45F7-A0BD-7C11A86BED57}"/>
+              </a:ext>
+              <a:ext uri="{C183D7F6-B498-43B3-948B-1728B52AA6E4}">
+                <adec:decorative xmlns:adec="http://schemas.microsoft.com/office/drawing/2017/decorative" val="1"/>
+              </a:ext>
+            </a:extLst>
+          </p:cNvPr>
+          <p:cNvCxnSpPr>
+            <a:cxnSpLocks noGrp="1" noRot="1" noChangeAspect="1" noMove="1" noResize="1" noEditPoints="1" noAdjustHandles="1" noChangeArrowheads="1" noChangeShapeType="1"/>
+          </p:cNvCxnSpPr>
+          <p:nvPr>
+            <p:extLst>
+              <p:ext uri="{386F3935-93C4-4BCD-93E2-E3B085C9AB24}">
+                <p16:designElem xmlns:p16="http://schemas.microsoft.com/office/powerpoint/2015/main" val="1"/>
+              </p:ext>
+            </p:extLst>
+          </p:nvPr>
+        </p:nvCxnSpPr>
+        <p:spPr>
+          <a:xfrm>
+            <a:off x="3490722" y="1200150"/>
+            <a:ext cx="0" cy="2743200"/>
+          </a:xfrm>
+          <a:prstGeom prst="line">
+            <a:avLst/>
+          </a:prstGeom>
+          <a:ln w="31750">
+            <a:solidFill>
+              <a:schemeClr val="tx1">
+                <a:alpha val="80000"/>
+              </a:schemeClr>
+            </a:solidFill>
+          </a:ln>
+        </p:spPr>
+        <p:style>
+          <a:lnRef idx="1">
+            <a:schemeClr val="accent1"/>
+          </a:lnRef>
+          <a:fillRef idx="0">
+            <a:schemeClr val="accent1"/>
+          </a:fillRef>
+          <a:effectRef idx="0">
+            <a:schemeClr val="accent1"/>
+          </a:effectRef>
+          <a:fontRef idx="minor">
+            <a:schemeClr val="tx1"/>
+          </a:fontRef>
+        </p:style>
+      </p:cxnSp>
+      <p:sp>
+        <p:nvSpPr>
+          <p:cNvPr id="3" name="Content Placeholder 2">
+            <a:extLst>
+              <a:ext uri="{FF2B5EF4-FFF2-40B4-BE49-F238E27FC236}">
+                <a16:creationId xmlns:a16="http://schemas.microsoft.com/office/drawing/2014/main" id="{CFA3B380-E5F0-5EAE-FE2C-3DB010BB4B1C}"/>
+              </a:ext>
+            </a:extLst>
+          </p:cNvPr>
+          <p:cNvSpPr>
+            <a:spLocks noGrp="1"/>
+          </p:cNvSpPr>
+          <p:nvPr>
+            <p:ph idx="1"/>
+          </p:nvPr>
+        </p:nvSpPr>
+        <p:spPr>
+          <a:xfrm>
+            <a:off x="3732477" y="895350"/>
+            <a:ext cx="4563818" cy="3524250"/>
+          </a:xfrm>
+        </p:spPr>
+        <p:txBody>
+          <a:bodyPr anchor="ctr">
+            <a:normAutofit/>
+          </a:bodyPr>
+          <a:lstStyle/>
+          <a:p>
+            <a:r>
+              <a:rPr lang="en-US"/>
+              <a:t>Hot Reload Feature</a:t>
+            </a:r>
+          </a:p>
+          <a:p>
+            <a:pPr lvl="1"/>
+            <a:r>
+              <a:rPr lang="en-US"/>
+              <a:t>XAML Hot Reload &amp; .NET Hot Reload enable instant code and markup changes, speeding up development &amp; reducing testing time.</a:t>
+            </a:r>
+          </a:p>
+          <a:p>
+            <a:r>
+              <a:rPr lang="en-US"/>
+              <a:t>Use of Templates</a:t>
+            </a:r>
+          </a:p>
+          <a:p>
+            <a:pPr lvl="1"/>
+            <a:r>
+              <a:rPr lang="en-US"/>
+              <a:t>Templates provide reusable structures, enhancing consistency &amp; saving time coding.</a:t>
+            </a:r>
+          </a:p>
+          <a:p>
+            <a:r>
+              <a:rPr lang="en-US"/>
+              <a:t>Extensions for Quality</a:t>
+            </a:r>
+          </a:p>
+          <a:p>
+            <a:pPr lvl="1"/>
+            <a:r>
+              <a:rPr lang="en-US"/>
+              <a:t>Visual Studio &amp; VS Code extensions add functionality &amp; help maintain high code quality across platforms.</a:t>
+            </a:r>
+          </a:p>
+        </p:txBody>
+      </p:sp>
+      <p:sp>
+        <p:nvSpPr>
+          <p:cNvPr id="19" name="Date Placeholder 1">
+            <a:extLst>
+              <a:ext uri="{FF2B5EF4-FFF2-40B4-BE49-F238E27FC236}">
+                <a16:creationId xmlns:a16="http://schemas.microsoft.com/office/drawing/2014/main" id="{3FBF03E8-C602-4192-9C52-F84B29FDCC88}"/>
+              </a:ext>
+              <a:ext uri="{C183D7F6-B498-43B3-948B-1728B52AA6E4}">
+                <adec:decorative xmlns:adec="http://schemas.microsoft.com/office/drawing/2017/decorative" val="1"/>
+              </a:ext>
+            </a:extLst>
+          </p:cNvPr>
+          <p:cNvSpPr txBox="1">
+            <a:spLocks noGrp="1" noRot="1" noChangeAspect="1" noMove="1" noResize="1" noEditPoints="1" noAdjustHandles="1" noChangeArrowheads="1" noChangeShapeType="1" noTextEdit="1"/>
+          </p:cNvSpPr>
+          <p:nvPr>
+            <p:extLst>
+              <p:ext uri="{386F3935-93C4-4BCD-93E2-E3B085C9AB24}">
+                <p16:designElem xmlns:p16="http://schemas.microsoft.com/office/powerpoint/2015/main" val="1"/>
+              </p:ext>
+            </p:extLst>
+          </p:nvPr>
+        </p:nvSpPr>
+        <p:spPr>
+          <a:xfrm>
+            <a:off x="5792421" y="4505908"/>
+            <a:ext cx="2625537" cy="231901"/>
+          </a:xfrm>
+          <a:prstGeom prst="rect">
+            <a:avLst/>
+          </a:prstGeom>
+        </p:spPr>
+        <p:txBody>
+          <a:bodyPr vert="horz" lIns="91440" tIns="45720" rIns="91440" bIns="45720" rtlCol="0" anchor="ctr"/>
+          <a:lstStyle>
+            <a:defPPr>
+              <a:defRPr lang="en-US"/>
+            </a:defPPr>
+            <a:lvl1pPr marL="0" algn="r" defTabSz="457200" rtl="0" eaLnBrk="1" latinLnBrk="0" hangingPunct="1">
+              <a:defRPr sz="1200" kern="1200">
+                <a:solidFill>
+                  <a:schemeClr val="tx1">
+                    <a:tint val="75000"/>
+                  </a:schemeClr>
+                </a:solidFill>
+                <a:latin typeface="+mn-lt"/>
+                <a:ea typeface="+mn-ea"/>
+                <a:cs typeface="+mn-cs"/>
+              </a:defRPr>
+            </a:lvl1pPr>
+            <a:lvl2pPr marL="457200" algn="l" defTabSz="457200" rtl="0" eaLnBrk="1" latinLnBrk="0" hangingPunct="1">
+              <a:defRPr sz="1800" kern="1200">
+                <a:solidFill>
+                  <a:schemeClr val="tx1"/>
+                </a:solidFill>
+                <a:latin typeface="+mn-lt"/>
+                <a:ea typeface="+mn-ea"/>
+                <a:cs typeface="+mn-cs"/>
+              </a:defRPr>
+            </a:lvl2pPr>
+            <a:lvl3pPr marL="914400" algn="l" defTabSz="457200" rtl="0" eaLnBrk="1" latinLnBrk="0" hangingPunct="1">
+              <a:defRPr sz="1800" kern="1200">
+                <a:solidFill>
+                  <a:schemeClr val="tx1"/>
+                </a:solidFill>
+                <a:latin typeface="+mn-lt"/>
+                <a:ea typeface="+mn-ea"/>
+                <a:cs typeface="+mn-cs"/>
+              </a:defRPr>
+            </a:lvl3pPr>
+            <a:lvl4pPr marL="1371600" algn="l" defTabSz="457200" rtl="0" eaLnBrk="1" latinLnBrk="0" hangingPunct="1">
+              <a:defRPr sz="1800" kern="1200">
+                <a:solidFill>
+                  <a:schemeClr val="tx1"/>
+                </a:solidFill>
+                <a:latin typeface="+mn-lt"/>
+                <a:ea typeface="+mn-ea"/>
+                <a:cs typeface="+mn-cs"/>
+              </a:defRPr>
+            </a:lvl4pPr>
+            <a:lvl5pPr marL="1828800" algn="l" defTabSz="457200" rtl="0" eaLnBrk="1" latinLnBrk="0" hangingPunct="1">
+              <a:defRPr sz="1800" kern="1200">
+                <a:solidFill>
+                  <a:schemeClr val="tx1"/>
+                </a:solidFill>
+                <a:latin typeface="+mn-lt"/>
+                <a:ea typeface="+mn-ea"/>
+                <a:cs typeface="+mn-cs"/>
+              </a:defRPr>
+            </a:lvl5pPr>
+            <a:lvl6pPr marL="2286000" algn="l" defTabSz="457200" rtl="0" eaLnBrk="1" latinLnBrk="0" hangingPunct="1">
+              <a:defRPr sz="1800" kern="1200">
+                <a:solidFill>
+                  <a:schemeClr val="tx1"/>
+                </a:solidFill>
+                <a:latin typeface="+mn-lt"/>
+                <a:ea typeface="+mn-ea"/>
+                <a:cs typeface="+mn-cs"/>
+              </a:defRPr>
+            </a:lvl6pPr>
+            <a:lvl7pPr marL="2743200" algn="l" defTabSz="457200" rtl="0" eaLnBrk="1" latinLnBrk="0" hangingPunct="1">
+              <a:defRPr sz="1800" kern="1200">
+                <a:solidFill>
+                  <a:schemeClr val="tx1"/>
+                </a:solidFill>
+                <a:latin typeface="+mn-lt"/>
+                <a:ea typeface="+mn-ea"/>
+                <a:cs typeface="+mn-cs"/>
+              </a:defRPr>
+            </a:lvl7pPr>
+            <a:lvl8pPr marL="3200400" algn="l" defTabSz="457200" rtl="0" eaLnBrk="1" latinLnBrk="0" hangingPunct="1">
+              <a:defRPr sz="1800" kern="1200">
+                <a:solidFill>
+                  <a:schemeClr val="tx1"/>
+                </a:solidFill>
+                <a:latin typeface="+mn-lt"/>
+                <a:ea typeface="+mn-ea"/>
+                <a:cs typeface="+mn-cs"/>
+              </a:defRPr>
+            </a:lvl8pPr>
+            <a:lvl9pPr marL="3657600" algn="l" defTabSz="457200" rtl="0" eaLnBrk="1" latinLnBrk="0" hangingPunct="1">
+              <a:defRPr sz="1800" kern="1200">
+                <a:solidFill>
+                  <a:schemeClr val="tx1"/>
+                </a:solidFill>
+                <a:latin typeface="+mn-lt"/>
+                <a:ea typeface="+mn-ea"/>
+                <a:cs typeface="+mn-cs"/>
+              </a:defRPr>
+            </a:lvl9pPr>
+          </a:lstStyle>
+          <a:p>
+            <a:endParaRPr lang="en-US" dirty="0">
+              <a:solidFill>
+                <a:schemeClr val="tx1"/>
+              </a:solidFill>
+            </a:endParaRPr>
+          </a:p>
+        </p:txBody>
+      </p:sp>
+    </p:spTree>
+    <p:extLst>
+      <p:ext uri="{BB962C8B-B14F-4D97-AF65-F5344CB8AC3E}">
+        <p14:creationId xmlns:p14="http://schemas.microsoft.com/office/powerpoint/2010/main" val="2695737749"/>
+      </p:ext>
+    </p:extLst>
+  </p:cSld>
+  <p:clrMapOvr>
+    <a:overrideClrMapping bg1="dk1" tx1="lt1" bg2="dk2" tx2="lt2" accent1="accent1" accent2="accent2" accent3="accent3" accent4="accent4" accent5="accent5" accent6="accent6" hlink="hlink" folHlink="folHlink"/>
+  </p:clrMapOvr>
+</p:sld>
+</file>
+
+<file path=ppt/slides/slide11.xml><?xml version="1.0" encoding="utf-8"?>
+<p:sld xmlns:a="http://schemas.openxmlformats.org/drawingml/2006/main" xmlns:r="http://schemas.openxmlformats.org/officeDocument/2006/relationships" xmlns:p="http://schemas.openxmlformats.org/presentationml/2006/main">
+  <p:cSld>
     <p:spTree>
       <p:nvGrpSpPr>
         <p:cNvPr id="1" name=""/>
@@ -28551,7 +29332,7 @@
 </p:sld>
 </file>
 
-<file path=ppt/slides/slide11.xml><?xml version="1.0" encoding="utf-8"?>
+<file path=ppt/slides/slide12.xml><?xml version="1.0" encoding="utf-8"?>
 <p:sld xmlns:a="http://schemas.openxmlformats.org/drawingml/2006/main" xmlns:r="http://schemas.openxmlformats.org/officeDocument/2006/relationships" xmlns:p="http://schemas.openxmlformats.org/presentationml/2006/main">
   <p:cSld>
     <p:bg>
@@ -28976,7 +29757,7 @@
 </p:sld>
 </file>
 
-<file path=ppt/slides/slide12.xml><?xml version="1.0" encoding="utf-8"?>
+<file path=ppt/slides/slide13.xml><?xml version="1.0" encoding="utf-8"?>
 <p:sld xmlns:a="http://schemas.openxmlformats.org/drawingml/2006/main" xmlns:r="http://schemas.openxmlformats.org/officeDocument/2006/relationships" xmlns:p="http://schemas.openxmlformats.org/presentationml/2006/main">
   <p:cSld>
     <p:bg>
@@ -29897,7 +30678,7 @@
 </p:sld>
 </file>
 
-<file path=ppt/slides/slide13.xml><?xml version="1.0" encoding="utf-8"?>
+<file path=ppt/slides/slide14.xml><?xml version="1.0" encoding="utf-8"?>
 <p:sld xmlns:a="http://schemas.openxmlformats.org/drawingml/2006/main" xmlns:r="http://schemas.openxmlformats.org/officeDocument/2006/relationships" xmlns:p="http://schemas.openxmlformats.org/presentationml/2006/main">
   <p:cSld>
     <p:bg>
@@ -30199,7 +30980,7 @@
 </p:sld>
 </file>
 
-<file path=ppt/slides/slide14.xml><?xml version="1.0" encoding="utf-8"?>
+<file path=ppt/slides/slide15.xml><?xml version="1.0" encoding="utf-8"?>
 <p:sld xmlns:a="http://schemas.openxmlformats.org/drawingml/2006/main" xmlns:r="http://schemas.openxmlformats.org/officeDocument/2006/relationships" xmlns:p="http://schemas.openxmlformats.org/presentationml/2006/main">
   <p:cSld>
     <p:bg>
@@ -30592,7 +31373,7 @@
 </p:sld>
 </file>
 
-<file path=ppt/slides/slide15.xml><?xml version="1.0" encoding="utf-8"?>
+<file path=ppt/slides/slide16.xml><?xml version="1.0" encoding="utf-8"?>
 <p:sld xmlns:a="http://schemas.openxmlformats.org/drawingml/2006/main" xmlns:r="http://schemas.openxmlformats.org/officeDocument/2006/relationships" xmlns:p="http://schemas.openxmlformats.org/presentationml/2006/main">
   <p:cSld>
     <p:spTree>
@@ -30676,7 +31457,7 @@
 </p:sld>
 </file>
 
-<file path=ppt/slides/slide16.xml><?xml version="1.0" encoding="utf-8"?>
+<file path=ppt/slides/slide17.xml><?xml version="1.0" encoding="utf-8"?>
 <p:sld xmlns:a="http://schemas.openxmlformats.org/drawingml/2006/main" xmlns:r="http://schemas.openxmlformats.org/officeDocument/2006/relationships" xmlns:p="http://schemas.openxmlformats.org/presentationml/2006/main">
   <p:cSld>
     <p:bg>
@@ -31056,7 +31837,7 @@
 </p:sld>
 </file>
 
-<file path=ppt/slides/slide17.xml><?xml version="1.0" encoding="utf-8"?>
+<file path=ppt/slides/slide18.xml><?xml version="1.0" encoding="utf-8"?>
 <p:sld xmlns:a="http://schemas.openxmlformats.org/drawingml/2006/main" xmlns:r="http://schemas.openxmlformats.org/officeDocument/2006/relationships" xmlns:p="http://schemas.openxmlformats.org/presentationml/2006/main">
   <p:cSld>
     <p:spTree>
@@ -31140,7 +31921,7 @@
 </p:sld>
 </file>
 
-<file path=ppt/slides/slide18.xml><?xml version="1.0" encoding="utf-8"?>
+<file path=ppt/slides/slide19.xml><?xml version="1.0" encoding="utf-8"?>
 <p:sld xmlns:a="http://schemas.openxmlformats.org/drawingml/2006/main" xmlns:r="http://schemas.openxmlformats.org/officeDocument/2006/relationships" xmlns:p="http://schemas.openxmlformats.org/presentationml/2006/main">
   <p:cSld>
     <p:bg>
@@ -31515,90 +32296,6 @@
   </p:cSld>
   <p:clrMapOvr>
     <a:overrideClrMapping bg1="dk1" tx1="lt1" bg2="dk2" tx2="lt2" accent1="accent1" accent2="accent2" accent3="accent3" accent4="accent4" accent5="accent5" accent6="accent6" hlink="hlink" folHlink="folHlink"/>
-  </p:clrMapOvr>
-</p:sld>
-</file>
-
-<file path=ppt/slides/slide19.xml><?xml version="1.0" encoding="utf-8"?>
-<p:sld xmlns:a="http://schemas.openxmlformats.org/drawingml/2006/main" xmlns:r="http://schemas.openxmlformats.org/officeDocument/2006/relationships" xmlns:p="http://schemas.openxmlformats.org/presentationml/2006/main">
-  <p:cSld>
-    <p:spTree>
-      <p:nvGrpSpPr>
-        <p:cNvPr id="1" name=""/>
-        <p:cNvGrpSpPr/>
-        <p:nvPr/>
-      </p:nvGrpSpPr>
-      <p:grpSpPr>
-        <a:xfrm>
-          <a:off x="0" y="0"/>
-          <a:ext cx="0" cy="0"/>
-          <a:chOff x="0" y="0"/>
-          <a:chExt cx="0" cy="0"/>
-        </a:xfrm>
-      </p:grpSpPr>
-      <p:sp>
-        <p:nvSpPr>
-          <p:cNvPr id="2" name="Title 1">
-            <a:extLst>
-              <a:ext uri="{FF2B5EF4-FFF2-40B4-BE49-F238E27FC236}">
-                <a16:creationId xmlns:a16="http://schemas.microsoft.com/office/drawing/2014/main" id="{417A6C5F-BDAF-505B-D899-D16536D5CCAA}"/>
-              </a:ext>
-            </a:extLst>
-          </p:cNvPr>
-          <p:cNvSpPr>
-            <a:spLocks noGrp="1"/>
-          </p:cNvSpPr>
-          <p:nvPr>
-            <p:ph type="title"/>
-          </p:nvPr>
-        </p:nvSpPr>
-        <p:spPr/>
-        <p:txBody>
-          <a:bodyPr/>
-          <a:lstStyle/>
-          <a:p>
-            <a:r>
-              <a:rPr lang="en-US" dirty="0"/>
-              <a:t>Device Feature Abstraction</a:t>
-            </a:r>
-          </a:p>
-        </p:txBody>
-      </p:sp>
-      <p:graphicFrame>
-        <p:nvGraphicFramePr>
-          <p:cNvPr id="5" name="Content Placeholder 2">
-            <a:extLst>
-              <a:ext uri="{FF2B5EF4-FFF2-40B4-BE49-F238E27FC236}">
-                <a16:creationId xmlns:a16="http://schemas.microsoft.com/office/drawing/2014/main" id="{189EC8AE-A2E9-C449-FEFA-6D914287F892}"/>
-              </a:ext>
-            </a:extLst>
-          </p:cNvPr>
-          <p:cNvGraphicFramePr>
-            <a:graphicFrameLocks noGrp="1"/>
-          </p:cNvGraphicFramePr>
-          <p:nvPr>
-            <p:ph idx="1"/>
-          </p:nvPr>
-        </p:nvGraphicFramePr>
-        <p:xfrm>
-          <a:off x="1088685" y="1511799"/>
-          <a:ext cx="7202456" cy="2587960"/>
-        </p:xfrm>
-        <a:graphic>
-          <a:graphicData uri="http://schemas.openxmlformats.org/drawingml/2006/diagram">
-            <dgm:relIds xmlns:dgm="http://schemas.openxmlformats.org/drawingml/2006/diagram" xmlns:r="http://schemas.openxmlformats.org/officeDocument/2006/relationships" r:dm="rId2" r:lo="rId3" r:qs="rId4" r:cs="rId5"/>
-          </a:graphicData>
-        </a:graphic>
-      </p:graphicFrame>
-    </p:spTree>
-    <p:extLst>
-      <p:ext uri="{BB962C8B-B14F-4D97-AF65-F5344CB8AC3E}">
-        <p14:creationId xmlns:p14="http://schemas.microsoft.com/office/powerpoint/2010/main" val="3237632335"/>
-      </p:ext>
-    </p:extLst>
-  </p:cSld>
-  <p:clrMapOvr>
-    <a:masterClrMapping/>
   </p:clrMapOvr>
 </p:sld>
 </file>
@@ -32451,6 +33148,90 @@
 <file path=ppt/slides/slide20.xml><?xml version="1.0" encoding="utf-8"?>
 <p:sld xmlns:a="http://schemas.openxmlformats.org/drawingml/2006/main" xmlns:r="http://schemas.openxmlformats.org/officeDocument/2006/relationships" xmlns:p="http://schemas.openxmlformats.org/presentationml/2006/main">
   <p:cSld>
+    <p:spTree>
+      <p:nvGrpSpPr>
+        <p:cNvPr id="1" name=""/>
+        <p:cNvGrpSpPr/>
+        <p:nvPr/>
+      </p:nvGrpSpPr>
+      <p:grpSpPr>
+        <a:xfrm>
+          <a:off x="0" y="0"/>
+          <a:ext cx="0" cy="0"/>
+          <a:chOff x="0" y="0"/>
+          <a:chExt cx="0" cy="0"/>
+        </a:xfrm>
+      </p:grpSpPr>
+      <p:sp>
+        <p:nvSpPr>
+          <p:cNvPr id="2" name="Title 1">
+            <a:extLst>
+              <a:ext uri="{FF2B5EF4-FFF2-40B4-BE49-F238E27FC236}">
+                <a16:creationId xmlns:a16="http://schemas.microsoft.com/office/drawing/2014/main" id="{417A6C5F-BDAF-505B-D899-D16536D5CCAA}"/>
+              </a:ext>
+            </a:extLst>
+          </p:cNvPr>
+          <p:cNvSpPr>
+            <a:spLocks noGrp="1"/>
+          </p:cNvSpPr>
+          <p:nvPr>
+            <p:ph type="title"/>
+          </p:nvPr>
+        </p:nvSpPr>
+        <p:spPr/>
+        <p:txBody>
+          <a:bodyPr/>
+          <a:lstStyle/>
+          <a:p>
+            <a:r>
+              <a:rPr lang="en-US" dirty="0"/>
+              <a:t>Device Feature Abstraction</a:t>
+            </a:r>
+          </a:p>
+        </p:txBody>
+      </p:sp>
+      <p:graphicFrame>
+        <p:nvGraphicFramePr>
+          <p:cNvPr id="5" name="Content Placeholder 2">
+            <a:extLst>
+              <a:ext uri="{FF2B5EF4-FFF2-40B4-BE49-F238E27FC236}">
+                <a16:creationId xmlns:a16="http://schemas.microsoft.com/office/drawing/2014/main" id="{189EC8AE-A2E9-C449-FEFA-6D914287F892}"/>
+              </a:ext>
+            </a:extLst>
+          </p:cNvPr>
+          <p:cNvGraphicFramePr>
+            <a:graphicFrameLocks noGrp="1"/>
+          </p:cNvGraphicFramePr>
+          <p:nvPr>
+            <p:ph idx="1"/>
+          </p:nvPr>
+        </p:nvGraphicFramePr>
+        <p:xfrm>
+          <a:off x="1088685" y="1511799"/>
+          <a:ext cx="7202456" cy="2587960"/>
+        </p:xfrm>
+        <a:graphic>
+          <a:graphicData uri="http://schemas.openxmlformats.org/drawingml/2006/diagram">
+            <dgm:relIds xmlns:dgm="http://schemas.openxmlformats.org/drawingml/2006/diagram" xmlns:r="http://schemas.openxmlformats.org/officeDocument/2006/relationships" r:dm="rId2" r:lo="rId3" r:qs="rId4" r:cs="rId5"/>
+          </a:graphicData>
+        </a:graphic>
+      </p:graphicFrame>
+    </p:spTree>
+    <p:extLst>
+      <p:ext uri="{BB962C8B-B14F-4D97-AF65-F5344CB8AC3E}">
+        <p14:creationId xmlns:p14="http://schemas.microsoft.com/office/powerpoint/2010/main" val="3237632335"/>
+      </p:ext>
+    </p:extLst>
+  </p:cSld>
+  <p:clrMapOvr>
+    <a:masterClrMapping/>
+  </p:clrMapOvr>
+</p:sld>
+</file>
+
+<file path=ppt/slides/slide21.xml><?xml version="1.0" encoding="utf-8"?>
+<p:sld xmlns:a="http://schemas.openxmlformats.org/drawingml/2006/main" xmlns:r="http://schemas.openxmlformats.org/officeDocument/2006/relationships" xmlns:p="http://schemas.openxmlformats.org/presentationml/2006/main">
+  <p:cSld>
     <p:bg>
       <p:bgPr>
         <a:gradFill rotWithShape="1">
@@ -32866,7 +33647,7 @@
 </p:sld>
 </file>
 
-<file path=ppt/slides/slide21.xml><?xml version="1.0" encoding="utf-8"?>
+<file path=ppt/slides/slide22.xml><?xml version="1.0" encoding="utf-8"?>
 <p:sld xmlns:a="http://schemas.openxmlformats.org/drawingml/2006/main" xmlns:r="http://schemas.openxmlformats.org/officeDocument/2006/relationships" xmlns:p="http://schemas.openxmlformats.org/presentationml/2006/main">
   <p:cSld>
     <p:bg>
@@ -33742,7 +34523,7 @@
 </p:sld>
 </file>
 
-<file path=ppt/slides/slide22.xml><?xml version="1.0" encoding="utf-8"?>
+<file path=ppt/slides/slide23.xml><?xml version="1.0" encoding="utf-8"?>
 <p:sld xmlns:a="http://schemas.openxmlformats.org/drawingml/2006/main" xmlns:r="http://schemas.openxmlformats.org/officeDocument/2006/relationships" xmlns:p="http://schemas.openxmlformats.org/presentationml/2006/main">
   <p:cSld>
     <p:bg>
@@ -34222,6 +35003,650 @@
       </p:grpSpPr>
       <p:sp>
         <p:nvSpPr>
+          <p:cNvPr id="13" name="Rectangle 12">
+            <a:extLst>
+              <a:ext uri="{FF2B5EF4-FFF2-40B4-BE49-F238E27FC236}">
+                <a16:creationId xmlns:a16="http://schemas.microsoft.com/office/drawing/2014/main" id="{EF6A578F-CEAC-4062-B6A7-640B1A396BCF}"/>
+              </a:ext>
+            </a:extLst>
+          </p:cNvPr>
+          <p:cNvSpPr/>
+          <p:nvPr/>
+        </p:nvSpPr>
+        <p:spPr>
+          <a:xfrm>
+            <a:off x="0" y="841728"/>
+            <a:ext cx="9144000" cy="4301773"/>
+          </a:xfrm>
+          <a:prstGeom prst="rect">
+            <a:avLst/>
+          </a:prstGeom>
+          <a:solidFill>
+            <a:srgbClr val="E3F1FA"/>
+          </a:solidFill>
+          <a:ln>
+            <a:noFill/>
+          </a:ln>
+        </p:spPr>
+        <p:style>
+          <a:lnRef idx="2">
+            <a:schemeClr val="accent1">
+              <a:shade val="50000"/>
+            </a:schemeClr>
+          </a:lnRef>
+          <a:fillRef idx="1">
+            <a:schemeClr val="accent1"/>
+          </a:fillRef>
+          <a:effectRef idx="0">
+            <a:schemeClr val="accent1"/>
+          </a:effectRef>
+          <a:fontRef idx="minor">
+            <a:schemeClr val="lt1"/>
+          </a:fontRef>
+        </p:style>
+        <p:txBody>
+          <a:bodyPr rtlCol="0" anchor="ctr"/>
+          <a:lstStyle/>
+          <a:p>
+            <a:pPr algn="ctr"/>
+            <a:endParaRPr lang="en-US"/>
+          </a:p>
+        </p:txBody>
+      </p:sp>
+      <p:sp>
+        <p:nvSpPr>
+          <p:cNvPr id="2" name="Rectangle 1">
+            <a:extLst>
+              <a:ext uri="{FF2B5EF4-FFF2-40B4-BE49-F238E27FC236}">
+                <a16:creationId xmlns:a16="http://schemas.microsoft.com/office/drawing/2014/main" id="{47ADA133-D8C7-4CA7-8F73-DBA01B8D925C}"/>
+              </a:ext>
+            </a:extLst>
+          </p:cNvPr>
+          <p:cNvSpPr/>
+          <p:nvPr/>
+        </p:nvSpPr>
+        <p:spPr>
+          <a:xfrm>
+            <a:off x="1" y="0"/>
+            <a:ext cx="9144000" cy="787940"/>
+          </a:xfrm>
+          <a:prstGeom prst="rect">
+            <a:avLst/>
+          </a:prstGeom>
+          <a:solidFill>
+            <a:schemeClr val="bg1"/>
+          </a:solidFill>
+          <a:ln>
+            <a:noFill/>
+          </a:ln>
+        </p:spPr>
+        <p:style>
+          <a:lnRef idx="2">
+            <a:schemeClr val="accent1">
+              <a:shade val="50000"/>
+            </a:schemeClr>
+          </a:lnRef>
+          <a:fillRef idx="1">
+            <a:schemeClr val="accent1"/>
+          </a:fillRef>
+          <a:effectRef idx="0">
+            <a:schemeClr val="accent1"/>
+          </a:effectRef>
+          <a:fontRef idx="minor">
+            <a:schemeClr val="lt1"/>
+          </a:fontRef>
+        </p:style>
+        <p:txBody>
+          <a:bodyPr rtlCol="0" anchor="ctr"/>
+          <a:lstStyle/>
+          <a:p>
+            <a:pPr algn="ctr"/>
+            <a:endParaRPr lang="en-US" dirty="0"/>
+          </a:p>
+        </p:txBody>
+      </p:sp>
+      <p:pic>
+        <p:nvPicPr>
+          <p:cNvPr id="4" name="Picture 4" descr="A picture containing text, map&#10;&#10;Description generated with very high confidence">
+            <a:extLst>
+              <a:ext uri="{FF2B5EF4-FFF2-40B4-BE49-F238E27FC236}">
+                <a16:creationId xmlns:a16="http://schemas.microsoft.com/office/drawing/2014/main" id="{2F15CFF6-EB6F-4E50-BCC9-09B91C4E1B1C}"/>
+              </a:ext>
+            </a:extLst>
+          </p:cNvPr>
+          <p:cNvPicPr>
+            <a:picLocks noChangeAspect="1"/>
+          </p:cNvPicPr>
+          <p:nvPr/>
+        </p:nvPicPr>
+        <p:blipFill>
+          <a:blip r:embed="rId2"/>
+          <a:stretch>
+            <a:fillRect/>
+          </a:stretch>
+        </p:blipFill>
+        <p:spPr>
+          <a:xfrm>
+            <a:off x="5837224" y="967619"/>
+            <a:ext cx="3188905" cy="1931011"/>
+          </a:xfrm>
+          <a:prstGeom prst="rect">
+            <a:avLst/>
+          </a:prstGeom>
+        </p:spPr>
+      </p:pic>
+      <p:sp>
+        <p:nvSpPr>
+          <p:cNvPr id="8" name="TextBox 7">
+            <a:extLst>
+              <a:ext uri="{FF2B5EF4-FFF2-40B4-BE49-F238E27FC236}">
+                <a16:creationId xmlns:a16="http://schemas.microsoft.com/office/drawing/2014/main" id="{DA79E18D-A6D8-4DDA-8EA0-0B22236190BC}"/>
+              </a:ext>
+            </a:extLst>
+          </p:cNvPr>
+          <p:cNvSpPr txBox="1"/>
+          <p:nvPr/>
+        </p:nvSpPr>
+        <p:spPr>
+          <a:xfrm>
+            <a:off x="117872" y="1000984"/>
+            <a:ext cx="8365331" cy="3219023"/>
+          </a:xfrm>
+          <a:prstGeom prst="rect">
+            <a:avLst/>
+          </a:prstGeom>
+          <a:noFill/>
+        </p:spPr>
+        <p:txBody>
+          <a:bodyPr rot="0" spcFirstLastPara="0" vertOverflow="overflow" horzOverflow="overflow" vert="horz" wrap="square" lIns="68580" tIns="34290" rIns="68580" bIns="34290" numCol="1" spcCol="0" rtlCol="0" fromWordArt="0" anchor="t" anchorCtr="0" forceAA="0" compatLnSpc="1">
+            <a:prstTxWarp prst="textNoShape">
+              <a:avLst/>
+            </a:prstTxWarp>
+            <a:spAutoFit/>
+          </a:bodyPr>
+          <a:lstStyle/>
+          <a:p>
+            <a:pPr marL="257175" indent="-257175">
+              <a:lnSpc>
+                <a:spcPct val="125000"/>
+              </a:lnSpc>
+              <a:buFont typeface="Wingdings" panose="05000000000000000000" pitchFamily="2" charset="2"/>
+              <a:buChar char="§"/>
+            </a:pPr>
+            <a:r>
+              <a:rPr lang="en-US" sz="1650" dirty="0">
+                <a:solidFill>
+                  <a:srgbClr val="121921"/>
+                </a:solidFill>
+                <a:latin typeface="Source Sans Pro" panose="020B0503030403020204" pitchFamily="34" charset="0"/>
+                <a:ea typeface="Source Sans Pro" panose="020B0503030403020204" pitchFamily="34" charset="0"/>
+                <a:cs typeface="Arial"/>
+              </a:rPr>
+              <a:t>Great speakers with top content</a:t>
+            </a:r>
+            <a:endParaRPr lang="en-US">
+              <a:cs typeface="Calibri" panose="020F0502020204030204"/>
+            </a:endParaRPr>
+          </a:p>
+          <a:p>
+            <a:pPr marL="257175" indent="-257175">
+              <a:lnSpc>
+                <a:spcPct val="125000"/>
+              </a:lnSpc>
+              <a:buFont typeface="Wingdings" panose="05000000000000000000" pitchFamily="2" charset="2"/>
+              <a:buChar char="§"/>
+            </a:pPr>
+            <a:r>
+              <a:rPr lang="en-US" sz="1650" dirty="0">
+                <a:solidFill>
+                  <a:srgbClr val="121921"/>
+                </a:solidFill>
+                <a:latin typeface="Source Sans Pro" panose="020B0503030403020204" pitchFamily="34" charset="0"/>
+                <a:ea typeface="Source Sans Pro" panose="020B0503030403020204" pitchFamily="34" charset="0"/>
+                <a:cs typeface="Arial"/>
+              </a:rPr>
+              <a:t>A fraction of the cost of the more crowded conferences </a:t>
+            </a:r>
+          </a:p>
+          <a:p>
+            <a:pPr>
+              <a:lnSpc>
+                <a:spcPct val="125000"/>
+              </a:lnSpc>
+            </a:pPr>
+            <a:r>
+              <a:rPr lang="en-US" sz="1650" dirty="0">
+                <a:solidFill>
+                  <a:srgbClr val="121921"/>
+                </a:solidFill>
+                <a:latin typeface="Source Sans Pro"/>
+                <a:ea typeface="Source Sans Pro"/>
+                <a:cs typeface="Arial"/>
+              </a:rPr>
+              <a:t>         - 3-day conference plus lodging for ~$1000 </a:t>
+            </a:r>
+          </a:p>
+          <a:p>
+            <a:pPr marL="257175" indent="-257175">
+              <a:lnSpc>
+                <a:spcPct val="125000"/>
+              </a:lnSpc>
+              <a:buFont typeface="Wingdings" panose="05000000000000000000" pitchFamily="2" charset="2"/>
+              <a:buChar char="§"/>
+            </a:pPr>
+            <a:r>
+              <a:rPr lang="en-US" sz="1650" dirty="0">
+                <a:solidFill>
+                  <a:srgbClr val="121921"/>
+                </a:solidFill>
+                <a:latin typeface="Source Sans Pro"/>
+                <a:ea typeface="Source Sans Pro"/>
+                <a:cs typeface="Arial"/>
+              </a:rPr>
+              <a:t>Full-day deep dive preconference sessions available</a:t>
+            </a:r>
+          </a:p>
+          <a:p>
+            <a:pPr marL="257175" indent="-257175">
+              <a:lnSpc>
+                <a:spcPct val="125000"/>
+              </a:lnSpc>
+              <a:buFont typeface="Wingdings" panose="05000000000000000000" pitchFamily="2" charset="2"/>
+              <a:buChar char="§"/>
+            </a:pPr>
+            <a:r>
+              <a:rPr lang="en-US" sz="1650" dirty="0">
+                <a:solidFill>
+                  <a:srgbClr val="121921"/>
+                </a:solidFill>
+                <a:latin typeface="Source Sans Pro"/>
+                <a:ea typeface="Source Sans Pro"/>
+                <a:cs typeface="Arial"/>
+              </a:rPr>
+              <a:t>Easy travel from almost anywhere</a:t>
+            </a:r>
+            <a:endParaRPr lang="en-US" sz="1650" dirty="0">
+              <a:solidFill>
+                <a:srgbClr val="121921"/>
+              </a:solidFill>
+              <a:latin typeface="Source Sans Pro"/>
+              <a:ea typeface="Source Sans Pro"/>
+              <a:cs typeface="Calibri"/>
+            </a:endParaRPr>
+          </a:p>
+          <a:p>
+            <a:pPr marL="257175" indent="-257175">
+              <a:lnSpc>
+                <a:spcPct val="125000"/>
+              </a:lnSpc>
+              <a:buFont typeface="Wingdings" panose="05000000000000000000" pitchFamily="2" charset="2"/>
+              <a:buChar char="§"/>
+            </a:pPr>
+            <a:r>
+              <a:rPr lang="en-US" sz="1650" dirty="0">
+                <a:solidFill>
+                  <a:srgbClr val="121921"/>
+                </a:solidFill>
+                <a:latin typeface="Source Sans Pro"/>
+                <a:ea typeface="Source Sans Pro"/>
+                <a:cs typeface="Arial"/>
+              </a:rPr>
+              <a:t>World-class keynotes</a:t>
+            </a:r>
+          </a:p>
+          <a:p>
+            <a:pPr marL="257175" indent="-257175">
+              <a:lnSpc>
+                <a:spcPct val="125000"/>
+              </a:lnSpc>
+              <a:buFont typeface="Wingdings" panose="05000000000000000000" pitchFamily="2" charset="2"/>
+              <a:buChar char="§"/>
+            </a:pPr>
+            <a:r>
+              <a:rPr lang="en-US" sz="1650" dirty="0">
+                <a:solidFill>
+                  <a:srgbClr val="121921"/>
+                </a:solidFill>
+                <a:latin typeface="Source Sans Pro"/>
+                <a:ea typeface="Source Sans Pro"/>
+                <a:cs typeface="Arial"/>
+              </a:rPr>
+              <a:t>In addition to the sessions, you get a great hallway </a:t>
+            </a:r>
+            <a:endParaRPr lang="en-US" sz="1650" dirty="0">
+              <a:solidFill>
+                <a:srgbClr val="121921"/>
+              </a:solidFill>
+              <a:latin typeface="Source Sans Pro" panose="020B0503030403020204" pitchFamily="34" charset="0"/>
+              <a:ea typeface="Source Sans Pro" panose="020B0503030403020204" pitchFamily="34" charset="0"/>
+              <a:cs typeface="Arial"/>
+            </a:endParaRPr>
+          </a:p>
+          <a:p>
+            <a:pPr>
+              <a:lnSpc>
+                <a:spcPct val="125000"/>
+              </a:lnSpc>
+            </a:pPr>
+            <a:r>
+              <a:rPr lang="en-US" sz="1650" dirty="0">
+                <a:solidFill>
+                  <a:srgbClr val="121921"/>
+                </a:solidFill>
+                <a:latin typeface="Source Sans Pro"/>
+                <a:ea typeface="Source Sans Pro"/>
+                <a:cs typeface="Arial"/>
+              </a:rPr>
+              <a:t>      Track, amazing food, attendee Welcome Reception, Game Night &amp; more</a:t>
+            </a:r>
+          </a:p>
+          <a:p>
+            <a:pPr marL="257175" indent="-257175">
+              <a:lnSpc>
+                <a:spcPct val="125000"/>
+              </a:lnSpc>
+              <a:buFont typeface="Wingdings" panose="05000000000000000000" pitchFamily="2" charset="2"/>
+              <a:buChar char="§"/>
+            </a:pPr>
+            <a:r>
+              <a:rPr lang="en-US" sz="1650" dirty="0">
+                <a:solidFill>
+                  <a:srgbClr val="121921"/>
+                </a:solidFill>
+                <a:latin typeface="Source Sans Pro"/>
+                <a:ea typeface="Source Sans Pro"/>
+                <a:cs typeface="Arial"/>
+              </a:rPr>
+              <a:t>Family Day Friday - full day of kids' sessions, free for attendees' families</a:t>
+            </a:r>
+          </a:p>
+          <a:p>
+            <a:pPr marL="257175" indent="-257175">
+              <a:lnSpc>
+                <a:spcPct val="125000"/>
+              </a:lnSpc>
+              <a:buFont typeface="Wingdings" panose="05000000000000000000" pitchFamily="2" charset="2"/>
+              <a:buChar char="§"/>
+            </a:pPr>
+            <a:r>
+              <a:rPr lang="en-US" sz="1650" dirty="0">
+                <a:solidFill>
+                  <a:srgbClr val="121921"/>
+                </a:solidFill>
+                <a:latin typeface="Source Sans Pro"/>
+                <a:ea typeface="Source Sans Pro"/>
+                <a:cs typeface="Arial"/>
+              </a:rPr>
+              <a:t>Discounted Kalahari Resort rooms with water park access: stay, learn &amp; play all week</a:t>
+            </a:r>
+          </a:p>
+        </p:txBody>
+      </p:sp>
+      <p:sp>
+        <p:nvSpPr>
+          <p:cNvPr id="9" name="TextBox 8">
+            <a:extLst>
+              <a:ext uri="{FF2B5EF4-FFF2-40B4-BE49-F238E27FC236}">
+                <a16:creationId xmlns:a16="http://schemas.microsoft.com/office/drawing/2014/main" id="{3E93AAE9-B6FF-416F-900F-43D38126E2F1}"/>
+              </a:ext>
+            </a:extLst>
+          </p:cNvPr>
+          <p:cNvSpPr txBox="1"/>
+          <p:nvPr/>
+        </p:nvSpPr>
+        <p:spPr>
+          <a:xfrm>
+            <a:off x="2485269" y="4645935"/>
+            <a:ext cx="4173461" cy="346249"/>
+          </a:xfrm>
+          <a:prstGeom prst="rect">
+            <a:avLst/>
+          </a:prstGeom>
+          <a:noFill/>
+        </p:spPr>
+        <p:txBody>
+          <a:bodyPr rot="0" spcFirstLastPara="0" vertOverflow="overflow" horzOverflow="overflow" vert="horz" wrap="square" lIns="68580" tIns="34290" rIns="68580" bIns="34290" numCol="1" spcCol="0" rtlCol="0" fromWordArt="0" anchor="t" anchorCtr="0" forceAA="0" compatLnSpc="1">
+            <a:prstTxWarp prst="textNoShape">
+              <a:avLst/>
+            </a:prstTxWarp>
+            <a:spAutoFit/>
+          </a:bodyPr>
+          <a:lstStyle/>
+          <a:p>
+            <a:r>
+              <a:rPr lang="en-US" dirty="0">
+                <a:solidFill>
+                  <a:srgbClr val="121921"/>
+                </a:solidFill>
+                <a:latin typeface="Source Sans Pro Black" panose="020B0803030403020204" pitchFamily="34" charset="0"/>
+                <a:ea typeface="Source Sans Pro" panose="020B0503030403020204" pitchFamily="34" charset="0"/>
+                <a:cs typeface="Segoe UI"/>
+                <a:hlinkClick r:id="rId3">
+                  <a:extLst>
+                    <a:ext uri="{A12FA001-AC4F-418D-AE19-62706E023703}">
+                      <ahyp:hlinkClr xmlns:ahyp="http://schemas.microsoft.com/office/drawing/2018/hyperlinkcolor" val="tx"/>
+                    </a:ext>
+                  </a:extLst>
+                </a:hlinkClick>
+              </a:rPr>
+              <a:t>https://techbash.com</a:t>
+            </a:r>
+            <a:r>
+              <a:rPr lang="en-US" dirty="0">
+                <a:solidFill>
+                  <a:srgbClr val="121921"/>
+                </a:solidFill>
+                <a:latin typeface="Source Sans Pro" panose="020B0503030403020204" pitchFamily="34" charset="0"/>
+                <a:ea typeface="Source Sans Pro" panose="020B0503030403020204" pitchFamily="34" charset="0"/>
+              </a:rPr>
+              <a:t> or </a:t>
+            </a:r>
+            <a:r>
+              <a:rPr lang="en-US" dirty="0">
+                <a:solidFill>
+                  <a:srgbClr val="121921"/>
+                </a:solidFill>
+                <a:latin typeface="Source Sans Pro Black" panose="020B0803030403020204" pitchFamily="34" charset="0"/>
+                <a:ea typeface="Source Sans Pro" panose="020B0503030403020204" pitchFamily="34" charset="0"/>
+              </a:rPr>
+              <a:t>@techbash</a:t>
+            </a:r>
+            <a:endParaRPr lang="en-US" dirty="0">
+              <a:solidFill>
+                <a:srgbClr val="121921"/>
+              </a:solidFill>
+              <a:latin typeface="Source Sans Pro Black" panose="020B0803030403020204" pitchFamily="34" charset="0"/>
+              <a:ea typeface="Source Sans Pro" panose="020B0503030403020204" pitchFamily="34" charset="0"/>
+              <a:cs typeface="Calibri"/>
+            </a:endParaRPr>
+          </a:p>
+        </p:txBody>
+      </p:sp>
+      <p:pic>
+        <p:nvPicPr>
+          <p:cNvPr id="10" name="Picture 10" descr="A picture containing indoor, building, table&#10;&#10;Description generated with high confidence">
+            <a:extLst>
+              <a:ext uri="{FF2B5EF4-FFF2-40B4-BE49-F238E27FC236}">
+                <a16:creationId xmlns:a16="http://schemas.microsoft.com/office/drawing/2014/main" id="{A92F3EB1-8376-4601-B443-DFB7DE3FFAA7}"/>
+              </a:ext>
+            </a:extLst>
+          </p:cNvPr>
+          <p:cNvPicPr>
+            <a:picLocks noChangeAspect="1"/>
+          </p:cNvPicPr>
+          <p:nvPr/>
+        </p:nvPicPr>
+        <p:blipFill>
+          <a:blip r:embed="rId4"/>
+          <a:stretch>
+            <a:fillRect/>
+          </a:stretch>
+        </p:blipFill>
+        <p:spPr>
+          <a:xfrm>
+            <a:off x="7997429" y="3057886"/>
+            <a:ext cx="1028700" cy="1271588"/>
+          </a:xfrm>
+          <a:prstGeom prst="rect">
+            <a:avLst/>
+          </a:prstGeom>
+        </p:spPr>
+      </p:pic>
+      <p:pic>
+        <p:nvPicPr>
+          <p:cNvPr id="5" name="Picture 4" descr="A close up of a logo&#10;&#10;Description automatically generated">
+            <a:extLst>
+              <a:ext uri="{FF2B5EF4-FFF2-40B4-BE49-F238E27FC236}">
+                <a16:creationId xmlns:a16="http://schemas.microsoft.com/office/drawing/2014/main" id="{5750C9C9-120D-4C81-BB23-3B8D109EA19A}"/>
+              </a:ext>
+            </a:extLst>
+          </p:cNvPr>
+          <p:cNvPicPr>
+            <a:picLocks noChangeAspect="1"/>
+          </p:cNvPicPr>
+          <p:nvPr/>
+        </p:nvPicPr>
+        <p:blipFill>
+          <a:blip r:embed="rId5" cstate="print">
+            <a:extLst>
+              <a:ext uri="{28A0092B-C50C-407E-A947-70E740481C1C}">
+                <a14:useLocalDpi xmlns:a14="http://schemas.microsoft.com/office/drawing/2010/main" val="0"/>
+              </a:ext>
+            </a:extLst>
+          </a:blip>
+          <a:stretch>
+            <a:fillRect/>
+          </a:stretch>
+        </p:blipFill>
+        <p:spPr>
+          <a:xfrm>
+            <a:off x="-1" y="794118"/>
+            <a:ext cx="9144000" cy="53788"/>
+          </a:xfrm>
+          <a:prstGeom prst="rect">
+            <a:avLst/>
+          </a:prstGeom>
+        </p:spPr>
+      </p:pic>
+      <p:pic>
+        <p:nvPicPr>
+          <p:cNvPr id="11" name="Picture 10">
+            <a:extLst>
+              <a:ext uri="{FF2B5EF4-FFF2-40B4-BE49-F238E27FC236}">
+                <a16:creationId xmlns:a16="http://schemas.microsoft.com/office/drawing/2014/main" id="{E2AA25F2-6048-4660-B47E-23A873B0ADF3}"/>
+              </a:ext>
+            </a:extLst>
+          </p:cNvPr>
+          <p:cNvPicPr>
+            <a:picLocks noChangeAspect="1"/>
+          </p:cNvPicPr>
+          <p:nvPr/>
+        </p:nvPicPr>
+        <p:blipFill>
+          <a:blip r:embed="rId6" cstate="print">
+            <a:extLst>
+              <a:ext uri="{28A0092B-C50C-407E-A947-70E740481C1C}">
+                <a14:useLocalDpi xmlns:a14="http://schemas.microsoft.com/office/drawing/2010/main" val="0"/>
+              </a:ext>
+            </a:extLst>
+          </a:blip>
+          <a:srcRect/>
+          <a:stretch/>
+        </p:blipFill>
+        <p:spPr>
+          <a:xfrm>
+            <a:off x="130945" y="102140"/>
+            <a:ext cx="2983017" cy="579497"/>
+          </a:xfrm>
+          <a:prstGeom prst="rect">
+            <a:avLst/>
+          </a:prstGeom>
+        </p:spPr>
+      </p:pic>
+      <p:sp>
+        <p:nvSpPr>
+          <p:cNvPr id="12" name="TextBox 11">
+            <a:extLst>
+              <a:ext uri="{FF2B5EF4-FFF2-40B4-BE49-F238E27FC236}">
+                <a16:creationId xmlns:a16="http://schemas.microsoft.com/office/drawing/2014/main" id="{938AB65C-AA84-47D6-9062-85EA15816E10}"/>
+              </a:ext>
+            </a:extLst>
+          </p:cNvPr>
+          <p:cNvSpPr txBox="1"/>
+          <p:nvPr/>
+        </p:nvSpPr>
+        <p:spPr>
+          <a:xfrm>
+            <a:off x="3173158" y="227195"/>
+            <a:ext cx="5911647" cy="438581"/>
+          </a:xfrm>
+          <a:prstGeom prst="rect">
+            <a:avLst/>
+          </a:prstGeom>
+          <a:noFill/>
+        </p:spPr>
+        <p:txBody>
+          <a:bodyPr rot="0" spcFirstLastPara="0" vertOverflow="overflow" horzOverflow="overflow" vert="horz" wrap="square" lIns="68580" tIns="34290" rIns="68580" bIns="34290" numCol="1" spcCol="0" rtlCol="0" fromWordArt="0" anchor="t" anchorCtr="0" forceAA="0" compatLnSpc="1">
+            <a:prstTxWarp prst="textNoShape">
+              <a:avLst/>
+            </a:prstTxWarp>
+            <a:noAutofit/>
+          </a:bodyPr>
+          <a:lstStyle/>
+          <a:p>
+            <a:pPr algn="r"/>
+            <a:r>
+              <a:rPr lang="en-US" sz="2400" dirty="0">
+                <a:solidFill>
+                  <a:srgbClr val="121921"/>
+                </a:solidFill>
+                <a:latin typeface="Oswald"/>
+                <a:cs typeface="Segoe UI"/>
+              </a:rPr>
+              <a:t>October 13-16, 2026 | Pocono Manor, PA</a:t>
+            </a:r>
+            <a:endParaRPr lang="en-US" sz="2400" dirty="0">
+              <a:solidFill>
+                <a:srgbClr val="121921"/>
+              </a:solidFill>
+              <a:latin typeface="Oswald"/>
+              <a:cs typeface="Calibri"/>
+            </a:endParaRPr>
+          </a:p>
+        </p:txBody>
+      </p:sp>
+    </p:spTree>
+    <p:extLst>
+      <p:ext uri="{BB962C8B-B14F-4D97-AF65-F5344CB8AC3E}">
+        <p14:creationId xmlns:p14="http://schemas.microsoft.com/office/powerpoint/2010/main" val="1708962353"/>
+      </p:ext>
+    </p:extLst>
+  </p:cSld>
+  <p:clrMapOvr>
+    <a:masterClrMapping/>
+  </p:clrMapOvr>
+</p:sld>
+</file>
+
+<file path=ppt/slides/slide5.xml><?xml version="1.0" encoding="utf-8"?>
+<p:sld xmlns:a="http://schemas.openxmlformats.org/drawingml/2006/main" xmlns:r="http://schemas.openxmlformats.org/officeDocument/2006/relationships" xmlns:p="http://schemas.openxmlformats.org/presentationml/2006/main">
+  <p:cSld>
+    <p:spTree>
+      <p:nvGrpSpPr>
+        <p:cNvPr id="1" name=""/>
+        <p:cNvGrpSpPr/>
+        <p:nvPr/>
+      </p:nvGrpSpPr>
+      <p:grpSpPr>
+        <a:xfrm>
+          <a:off x="0" y="0"/>
+          <a:ext cx="0" cy="0"/>
+          <a:chOff x="0" y="0"/>
+          <a:chExt cx="0" cy="0"/>
+        </a:xfrm>
+      </p:grpSpPr>
+      <p:sp>
+        <p:nvSpPr>
           <p:cNvPr id="2" name="Title 1">
             <a:extLst>
               <a:ext uri="{FF2B5EF4-FFF2-40B4-BE49-F238E27FC236}">
@@ -34313,7 +35738,7 @@
 </p:sld>
 </file>
 
-<file path=ppt/slides/slide5.xml><?xml version="1.0" encoding="utf-8"?>
+<file path=ppt/slides/slide6.xml><?xml version="1.0" encoding="utf-8"?>
 <p:sld xmlns:a="http://schemas.openxmlformats.org/drawingml/2006/main" xmlns:r="http://schemas.openxmlformats.org/officeDocument/2006/relationships" xmlns:p="http://schemas.openxmlformats.org/presentationml/2006/main">
   <p:cSld>
     <p:bg>
@@ -34726,7 +36151,7 @@
 </p:sld>
 </file>
 
-<file path=ppt/slides/slide6.xml><?xml version="1.0" encoding="utf-8"?>
+<file path=ppt/slides/slide7.xml><?xml version="1.0" encoding="utf-8"?>
 <p:sld xmlns:a="http://schemas.openxmlformats.org/drawingml/2006/main" xmlns:r="http://schemas.openxmlformats.org/officeDocument/2006/relationships" xmlns:p="http://schemas.openxmlformats.org/presentationml/2006/main">
   <p:cSld>
     <p:spTree>
@@ -34862,7 +36287,7 @@
 </p:sld>
 </file>
 
-<file path=ppt/slides/slide7.xml><?xml version="1.0" encoding="utf-8"?>
+<file path=ppt/slides/slide8.xml><?xml version="1.0" encoding="utf-8"?>
 <p:sld xmlns:a="http://schemas.openxmlformats.org/drawingml/2006/main" xmlns:r="http://schemas.openxmlformats.org/officeDocument/2006/relationships" xmlns:p="http://schemas.openxmlformats.org/presentationml/2006/main">
   <p:cSld>
     <p:bg>
@@ -35275,7 +36700,7 @@
 </p:sld>
 </file>
 
-<file path=ppt/slides/slide8.xml><?xml version="1.0" encoding="utf-8"?>
+<file path=ppt/slides/slide9.xml><?xml version="1.0" encoding="utf-8"?>
 <p:sld xmlns:a="http://schemas.openxmlformats.org/drawingml/2006/main" xmlns:r="http://schemas.openxmlformats.org/officeDocument/2006/relationships" xmlns:p="http://schemas.openxmlformats.org/presentationml/2006/main">
   <p:cSld>
     <p:bg>
@@ -35410,786 +36835,6 @@
     <p:extLst>
       <p:ext uri="{BB962C8B-B14F-4D97-AF65-F5344CB8AC3E}">
         <p14:creationId xmlns:p14="http://schemas.microsoft.com/office/powerpoint/2010/main" val="4218931778"/>
-      </p:ext>
-    </p:extLst>
-  </p:cSld>
-  <p:clrMapOvr>
-    <a:overrideClrMapping bg1="dk1" tx1="lt1" bg2="dk2" tx2="lt2" accent1="accent1" accent2="accent2" accent3="accent3" accent4="accent4" accent5="accent5" accent6="accent6" hlink="hlink" folHlink="folHlink"/>
-  </p:clrMapOvr>
-</p:sld>
-</file>
-
-<file path=ppt/slides/slide9.xml><?xml version="1.0" encoding="utf-8"?>
-<p:sld xmlns:a="http://schemas.openxmlformats.org/drawingml/2006/main" xmlns:r="http://schemas.openxmlformats.org/officeDocument/2006/relationships" xmlns:p="http://schemas.openxmlformats.org/presentationml/2006/main">
-  <p:cSld>
-    <p:bg>
-      <p:bgPr>
-        <a:solidFill>
-          <a:schemeClr val="bg1"/>
-        </a:solidFill>
-        <a:effectLst/>
-      </p:bgPr>
-    </p:bg>
-    <p:spTree>
-      <p:nvGrpSpPr>
-        <p:cNvPr id="1" name=""/>
-        <p:cNvGrpSpPr/>
-        <p:nvPr/>
-      </p:nvGrpSpPr>
-      <p:grpSpPr>
-        <a:xfrm>
-          <a:off x="0" y="0"/>
-          <a:ext cx="0" cy="0"/>
-          <a:chOff x="0" y="0"/>
-          <a:chExt cx="0" cy="0"/>
-        </a:xfrm>
-      </p:grpSpPr>
-      <p:sp useBgFill="1">
-        <p:nvSpPr>
-          <p:cNvPr id="16" name="Rectangle 15">
-            <a:extLst>
-              <a:ext uri="{FF2B5EF4-FFF2-40B4-BE49-F238E27FC236}">
-                <a16:creationId xmlns:a16="http://schemas.microsoft.com/office/drawing/2014/main" id="{C6870151-9189-4C3A-8379-EF3D95827A0A}"/>
-              </a:ext>
-              <a:ext uri="{C183D7F6-B498-43B3-948B-1728B52AA6E4}">
-                <adec:decorative xmlns:adec="http://schemas.microsoft.com/office/drawing/2017/decorative" val="1"/>
-              </a:ext>
-            </a:extLst>
-          </p:cNvPr>
-          <p:cNvSpPr>
-            <a:spLocks noGrp="1" noRot="1" noChangeAspect="1" noMove="1" noResize="1" noEditPoints="1" noAdjustHandles="1" noChangeArrowheads="1" noChangeShapeType="1" noTextEdit="1"/>
-          </p:cNvSpPr>
-          <p:nvPr>
-            <p:extLst>
-              <p:ext uri="{386F3935-93C4-4BCD-93E2-E3B085C9AB24}">
-                <p16:designElem xmlns:p16="http://schemas.microsoft.com/office/powerpoint/2015/main" val="1"/>
-              </p:ext>
-            </p:extLst>
-          </p:nvPr>
-        </p:nvSpPr>
-        <p:spPr>
-          <a:xfrm>
-            <a:off x="0" y="0"/>
-            <a:ext cx="9144000" cy="5143500"/>
-          </a:xfrm>
-          <a:prstGeom prst="rect">
-            <a:avLst/>
-          </a:prstGeom>
-          <a:ln>
-            <a:noFill/>
-          </a:ln>
-        </p:spPr>
-        <p:style>
-          <a:lnRef idx="2">
-            <a:schemeClr val="accent1">
-              <a:shade val="50000"/>
-            </a:schemeClr>
-          </a:lnRef>
-          <a:fillRef idx="1">
-            <a:schemeClr val="accent1"/>
-          </a:fillRef>
-          <a:effectRef idx="0">
-            <a:schemeClr val="accent1"/>
-          </a:effectRef>
-          <a:fontRef idx="minor">
-            <a:schemeClr val="lt1"/>
-          </a:fontRef>
-        </p:style>
-        <p:txBody>
-          <a:bodyPr rtlCol="0" anchor="ctr"/>
-          <a:lstStyle/>
-          <a:p>
-            <a:pPr algn="ctr"/>
-            <a:endParaRPr lang="en-US"/>
-          </a:p>
-        </p:txBody>
-      </p:sp>
-      <p:pic>
-        <p:nvPicPr>
-          <p:cNvPr id="18" name="Picture 17" descr="Periodic table illustration">
-            <a:extLst>
-              <a:ext uri="{FF2B5EF4-FFF2-40B4-BE49-F238E27FC236}">
-                <a16:creationId xmlns:a16="http://schemas.microsoft.com/office/drawing/2014/main" id="{D68061D6-DECB-3E54-19F7-38C42E4BE120}"/>
-              </a:ext>
-            </a:extLst>
-          </p:cNvPr>
-          <p:cNvPicPr>
-            <a:picLocks noChangeAspect="1"/>
-          </p:cNvPicPr>
-          <p:nvPr/>
-        </p:nvPicPr>
-        <p:blipFill>
-          <a:blip r:embed="rId3">
-            <a:alphaModFix amt="50000"/>
-            <a:grayscl/>
-          </a:blip>
-          <a:srcRect t="6787" r="-2" b="36960"/>
-          <a:stretch>
-            <a:fillRect/>
-          </a:stretch>
-        </p:blipFill>
-        <p:spPr>
-          <a:xfrm>
-            <a:off x="228" y="10"/>
-            <a:ext cx="9143772" cy="5143490"/>
-          </a:xfrm>
-          <a:prstGeom prst="rect">
-            <a:avLst/>
-          </a:prstGeom>
-        </p:spPr>
-      </p:pic>
-      <p:sp>
-        <p:nvSpPr>
-          <p:cNvPr id="20" name="Slide Number Placeholder 7">
-            <a:extLst>
-              <a:ext uri="{FF2B5EF4-FFF2-40B4-BE49-F238E27FC236}">
-                <a16:creationId xmlns:a16="http://schemas.microsoft.com/office/drawing/2014/main" id="{123EA69C-102A-4DD0-9547-05DCD271D159}"/>
-              </a:ext>
-              <a:ext uri="{C183D7F6-B498-43B3-948B-1728B52AA6E4}">
-                <adec:decorative xmlns:adec="http://schemas.microsoft.com/office/drawing/2017/decorative" val="1"/>
-              </a:ext>
-            </a:extLst>
-          </p:cNvPr>
-          <p:cNvSpPr txBox="1">
-            <a:spLocks noGrp="1" noRot="1" noChangeAspect="1" noMove="1" noResize="1" noEditPoints="1" noAdjustHandles="1" noChangeArrowheads="1" noChangeShapeType="1" noTextEdit="1"/>
-          </p:cNvSpPr>
-          <p:nvPr>
-            <p:extLst>
-              <p:ext uri="{386F3935-93C4-4BCD-93E2-E3B085C9AB24}">
-                <p16:designElem xmlns:p16="http://schemas.microsoft.com/office/powerpoint/2015/main" val="1"/>
-              </p:ext>
-            </p:extLst>
-          </p:nvPr>
-        </p:nvSpPr>
-        <p:spPr>
-          <a:xfrm>
-            <a:off x="2634225" y="332799"/>
-            <a:ext cx="608265" cy="377683"/>
-          </a:xfrm>
-          <a:prstGeom prst="rect">
-            <a:avLst/>
-          </a:prstGeom>
-        </p:spPr>
-        <p:txBody>
-          <a:bodyPr vert="horz" lIns="91440" tIns="45720" rIns="91440" bIns="45720" rtlCol="0" anchor="t"/>
-          <a:lstStyle>
-            <a:defPPr>
-              <a:defRPr lang="en-US"/>
-            </a:defPPr>
-            <a:lvl1pPr marL="0" algn="r" defTabSz="457200" rtl="0" eaLnBrk="1" latinLnBrk="0" hangingPunct="1">
-              <a:defRPr sz="2800" kern="1200">
-                <a:solidFill>
-                  <a:schemeClr val="accent1"/>
-                </a:solidFill>
-                <a:latin typeface="+mn-lt"/>
-                <a:ea typeface="+mn-ea"/>
-                <a:cs typeface="+mn-cs"/>
-              </a:defRPr>
-            </a:lvl1pPr>
-            <a:lvl2pPr marL="457200" algn="l" defTabSz="457200" rtl="0" eaLnBrk="1" latinLnBrk="0" hangingPunct="1">
-              <a:defRPr sz="1800" kern="1200">
-                <a:solidFill>
-                  <a:schemeClr val="tx1"/>
-                </a:solidFill>
-                <a:latin typeface="+mn-lt"/>
-                <a:ea typeface="+mn-ea"/>
-                <a:cs typeface="+mn-cs"/>
-              </a:defRPr>
-            </a:lvl2pPr>
-            <a:lvl3pPr marL="914400" algn="l" defTabSz="457200" rtl="0" eaLnBrk="1" latinLnBrk="0" hangingPunct="1">
-              <a:defRPr sz="1800" kern="1200">
-                <a:solidFill>
-                  <a:schemeClr val="tx1"/>
-                </a:solidFill>
-                <a:latin typeface="+mn-lt"/>
-                <a:ea typeface="+mn-ea"/>
-                <a:cs typeface="+mn-cs"/>
-              </a:defRPr>
-            </a:lvl3pPr>
-            <a:lvl4pPr marL="1371600" algn="l" defTabSz="457200" rtl="0" eaLnBrk="1" latinLnBrk="0" hangingPunct="1">
-              <a:defRPr sz="1800" kern="1200">
-                <a:solidFill>
-                  <a:schemeClr val="tx1"/>
-                </a:solidFill>
-                <a:latin typeface="+mn-lt"/>
-                <a:ea typeface="+mn-ea"/>
-                <a:cs typeface="+mn-cs"/>
-              </a:defRPr>
-            </a:lvl4pPr>
-            <a:lvl5pPr marL="1828800" algn="l" defTabSz="457200" rtl="0" eaLnBrk="1" latinLnBrk="0" hangingPunct="1">
-              <a:defRPr sz="1800" kern="1200">
-                <a:solidFill>
-                  <a:schemeClr val="tx1"/>
-                </a:solidFill>
-                <a:latin typeface="+mn-lt"/>
-                <a:ea typeface="+mn-ea"/>
-                <a:cs typeface="+mn-cs"/>
-              </a:defRPr>
-            </a:lvl5pPr>
-            <a:lvl6pPr marL="2286000" algn="l" defTabSz="457200" rtl="0" eaLnBrk="1" latinLnBrk="0" hangingPunct="1">
-              <a:defRPr sz="1800" kern="1200">
-                <a:solidFill>
-                  <a:schemeClr val="tx1"/>
-                </a:solidFill>
-                <a:latin typeface="+mn-lt"/>
-                <a:ea typeface="+mn-ea"/>
-                <a:cs typeface="+mn-cs"/>
-              </a:defRPr>
-            </a:lvl6pPr>
-            <a:lvl7pPr marL="2743200" algn="l" defTabSz="457200" rtl="0" eaLnBrk="1" latinLnBrk="0" hangingPunct="1">
-              <a:defRPr sz="1800" kern="1200">
-                <a:solidFill>
-                  <a:schemeClr val="tx1"/>
-                </a:solidFill>
-                <a:latin typeface="+mn-lt"/>
-                <a:ea typeface="+mn-ea"/>
-                <a:cs typeface="+mn-cs"/>
-              </a:defRPr>
-            </a:lvl7pPr>
-            <a:lvl8pPr marL="3200400" algn="l" defTabSz="457200" rtl="0" eaLnBrk="1" latinLnBrk="0" hangingPunct="1">
-              <a:defRPr sz="1800" kern="1200">
-                <a:solidFill>
-                  <a:schemeClr val="tx1"/>
-                </a:solidFill>
-                <a:latin typeface="+mn-lt"/>
-                <a:ea typeface="+mn-ea"/>
-                <a:cs typeface="+mn-cs"/>
-              </a:defRPr>
-            </a:lvl8pPr>
-            <a:lvl9pPr marL="3657600" algn="l" defTabSz="457200" rtl="0" eaLnBrk="1" latinLnBrk="0" hangingPunct="1">
-              <a:defRPr sz="1800" kern="1200">
-                <a:solidFill>
-                  <a:schemeClr val="tx1"/>
-                </a:solidFill>
-                <a:latin typeface="+mn-lt"/>
-                <a:ea typeface="+mn-ea"/>
-                <a:cs typeface="+mn-cs"/>
-              </a:defRPr>
-            </a:lvl9pPr>
-          </a:lstStyle>
-          <a:p>
-            <a:endParaRPr lang="en-US" dirty="0"/>
-          </a:p>
-        </p:txBody>
-      </p:sp>
-      <p:sp>
-        <p:nvSpPr>
-          <p:cNvPr id="21" name="Footer Placeholder 6">
-            <a:extLst>
-              <a:ext uri="{FF2B5EF4-FFF2-40B4-BE49-F238E27FC236}">
-                <a16:creationId xmlns:a16="http://schemas.microsoft.com/office/drawing/2014/main" id="{6A862265-5CA3-4C40-8582-7534C3B03C2A}"/>
-              </a:ext>
-              <a:ext uri="{C183D7F6-B498-43B3-948B-1728B52AA6E4}">
-                <adec:decorative xmlns:adec="http://schemas.microsoft.com/office/drawing/2017/decorative" val="1"/>
-              </a:ext>
-            </a:extLst>
-          </p:cNvPr>
-          <p:cNvSpPr txBox="1">
-            <a:spLocks noGrp="1" noRot="1" noChangeAspect="1" noMove="1" noResize="1" noEditPoints="1" noAdjustHandles="1" noChangeArrowheads="1" noChangeShapeType="1" noTextEdit="1"/>
-          </p:cNvSpPr>
-          <p:nvPr>
-            <p:extLst>
-              <p:ext uri="{386F3935-93C4-4BCD-93E2-E3B085C9AB24}">
-                <p16:designElem xmlns:p16="http://schemas.microsoft.com/office/powerpoint/2015/main" val="1"/>
-              </p:ext>
-            </p:extLst>
-          </p:nvPr>
-        </p:nvSpPr>
-        <p:spPr>
-          <a:xfrm>
-            <a:off x="3732477" y="405690"/>
-            <a:ext cx="3730436" cy="231901"/>
-          </a:xfrm>
-          <a:prstGeom prst="rect">
-            <a:avLst/>
-          </a:prstGeom>
-        </p:spPr>
-        <p:txBody>
-          <a:bodyPr vert="horz" lIns="91440" tIns="45720" rIns="91440" bIns="45720" rtlCol="0" anchor="ctr"/>
-          <a:lstStyle>
-            <a:defPPr>
-              <a:defRPr lang="en-US"/>
-            </a:defPPr>
-            <a:lvl1pPr marL="0" algn="l" defTabSz="457200" rtl="0" eaLnBrk="1" latinLnBrk="0" hangingPunct="1">
-              <a:defRPr sz="1200" kern="1200">
-                <a:solidFill>
-                  <a:schemeClr val="tx1">
-                    <a:tint val="75000"/>
-                  </a:schemeClr>
-                </a:solidFill>
-                <a:latin typeface="+mn-lt"/>
-                <a:ea typeface="+mn-ea"/>
-                <a:cs typeface="+mn-cs"/>
-              </a:defRPr>
-            </a:lvl1pPr>
-            <a:lvl2pPr marL="457200" algn="l" defTabSz="457200" rtl="0" eaLnBrk="1" latinLnBrk="0" hangingPunct="1">
-              <a:defRPr sz="1800" kern="1200">
-                <a:solidFill>
-                  <a:schemeClr val="tx1"/>
-                </a:solidFill>
-                <a:latin typeface="+mn-lt"/>
-                <a:ea typeface="+mn-ea"/>
-                <a:cs typeface="+mn-cs"/>
-              </a:defRPr>
-            </a:lvl2pPr>
-            <a:lvl3pPr marL="914400" algn="l" defTabSz="457200" rtl="0" eaLnBrk="1" latinLnBrk="0" hangingPunct="1">
-              <a:defRPr sz="1800" kern="1200">
-                <a:solidFill>
-                  <a:schemeClr val="tx1"/>
-                </a:solidFill>
-                <a:latin typeface="+mn-lt"/>
-                <a:ea typeface="+mn-ea"/>
-                <a:cs typeface="+mn-cs"/>
-              </a:defRPr>
-            </a:lvl3pPr>
-            <a:lvl4pPr marL="1371600" algn="l" defTabSz="457200" rtl="0" eaLnBrk="1" latinLnBrk="0" hangingPunct="1">
-              <a:defRPr sz="1800" kern="1200">
-                <a:solidFill>
-                  <a:schemeClr val="tx1"/>
-                </a:solidFill>
-                <a:latin typeface="+mn-lt"/>
-                <a:ea typeface="+mn-ea"/>
-                <a:cs typeface="+mn-cs"/>
-              </a:defRPr>
-            </a:lvl4pPr>
-            <a:lvl5pPr marL="1828800" algn="l" defTabSz="457200" rtl="0" eaLnBrk="1" latinLnBrk="0" hangingPunct="1">
-              <a:defRPr sz="1800" kern="1200">
-                <a:solidFill>
-                  <a:schemeClr val="tx1"/>
-                </a:solidFill>
-                <a:latin typeface="+mn-lt"/>
-                <a:ea typeface="+mn-ea"/>
-                <a:cs typeface="+mn-cs"/>
-              </a:defRPr>
-            </a:lvl5pPr>
-            <a:lvl6pPr marL="2286000" algn="l" defTabSz="457200" rtl="0" eaLnBrk="1" latinLnBrk="0" hangingPunct="1">
-              <a:defRPr sz="1800" kern="1200">
-                <a:solidFill>
-                  <a:schemeClr val="tx1"/>
-                </a:solidFill>
-                <a:latin typeface="+mn-lt"/>
-                <a:ea typeface="+mn-ea"/>
-                <a:cs typeface="+mn-cs"/>
-              </a:defRPr>
-            </a:lvl6pPr>
-            <a:lvl7pPr marL="2743200" algn="l" defTabSz="457200" rtl="0" eaLnBrk="1" latinLnBrk="0" hangingPunct="1">
-              <a:defRPr sz="1800" kern="1200">
-                <a:solidFill>
-                  <a:schemeClr val="tx1"/>
-                </a:solidFill>
-                <a:latin typeface="+mn-lt"/>
-                <a:ea typeface="+mn-ea"/>
-                <a:cs typeface="+mn-cs"/>
-              </a:defRPr>
-            </a:lvl7pPr>
-            <a:lvl8pPr marL="3200400" algn="l" defTabSz="457200" rtl="0" eaLnBrk="1" latinLnBrk="0" hangingPunct="1">
-              <a:defRPr sz="1800" kern="1200">
-                <a:solidFill>
-                  <a:schemeClr val="tx1"/>
-                </a:solidFill>
-                <a:latin typeface="+mn-lt"/>
-                <a:ea typeface="+mn-ea"/>
-                <a:cs typeface="+mn-cs"/>
-              </a:defRPr>
-            </a:lvl8pPr>
-            <a:lvl9pPr marL="3657600" algn="l" defTabSz="457200" rtl="0" eaLnBrk="1" latinLnBrk="0" hangingPunct="1">
-              <a:defRPr sz="1800" kern="1200">
-                <a:solidFill>
-                  <a:schemeClr val="tx1"/>
-                </a:solidFill>
-                <a:latin typeface="+mn-lt"/>
-                <a:ea typeface="+mn-ea"/>
-                <a:cs typeface="+mn-cs"/>
-              </a:defRPr>
-            </a:lvl9pPr>
-          </a:lstStyle>
-          <a:p>
-            <a:endParaRPr lang="en-US" dirty="0">
-              <a:solidFill>
-                <a:schemeClr val="tx1"/>
-              </a:solidFill>
-            </a:endParaRPr>
-          </a:p>
-        </p:txBody>
-      </p:sp>
-      <p:sp>
-        <p:nvSpPr>
-          <p:cNvPr id="15" name="Rectangle 14">
-            <a:extLst>
-              <a:ext uri="{FF2B5EF4-FFF2-40B4-BE49-F238E27FC236}">
-                <a16:creationId xmlns:a16="http://schemas.microsoft.com/office/drawing/2014/main" id="{600EF80B-0391-4082-9AF5-F15B091B4CE9}"/>
-              </a:ext>
-              <a:ext uri="{C183D7F6-B498-43B3-948B-1728B52AA6E4}">
-                <adec:decorative xmlns:adec="http://schemas.microsoft.com/office/drawing/2017/decorative" val="1"/>
-              </a:ext>
-            </a:extLst>
-          </p:cNvPr>
-          <p:cNvSpPr>
-            <a:spLocks noGrp="1" noRot="1" noChangeAspect="1" noMove="1" noResize="1" noEditPoints="1" noAdjustHandles="1" noChangeArrowheads="1" noChangeShapeType="1" noTextEdit="1"/>
-          </p:cNvSpPr>
-          <p:nvPr>
-            <p:extLst>
-              <p:ext uri="{386F3935-93C4-4BCD-93E2-E3B085C9AB24}">
-                <p16:designElem xmlns:p16="http://schemas.microsoft.com/office/powerpoint/2015/main" val="1"/>
-              </p:ext>
-            </p:extLst>
-          </p:nvPr>
-        </p:nvSpPr>
-        <p:spPr>
-          <a:xfrm>
-            <a:off x="0" y="895350"/>
-            <a:ext cx="9144000" cy="4248149"/>
-          </a:xfrm>
-          <a:prstGeom prst="rect">
-            <a:avLst/>
-          </a:prstGeom>
-          <a:gradFill flip="none" rotWithShape="1">
-            <a:gsLst>
-              <a:gs pos="0">
-                <a:schemeClr val="bg2">
-                  <a:lumMod val="87000"/>
-                  <a:alpha val="4000"/>
-                </a:schemeClr>
-              </a:gs>
-              <a:gs pos="100000">
-                <a:schemeClr val="bg2">
-                  <a:lumMod val="95000"/>
-                  <a:lumOff val="5000"/>
-                </a:schemeClr>
-              </a:gs>
-            </a:gsLst>
-            <a:lin ang="5400000" scaled="0"/>
-            <a:tileRect/>
-          </a:gradFill>
-          <a:ln>
-            <a:noFill/>
-          </a:ln>
-        </p:spPr>
-        <p:style>
-          <a:lnRef idx="2">
-            <a:schemeClr val="accent1">
-              <a:shade val="50000"/>
-            </a:schemeClr>
-          </a:lnRef>
-          <a:fillRef idx="1">
-            <a:schemeClr val="accent1"/>
-          </a:fillRef>
-          <a:effectRef idx="0">
-            <a:schemeClr val="accent1"/>
-          </a:effectRef>
-          <a:fontRef idx="minor">
-            <a:schemeClr val="lt1"/>
-          </a:fontRef>
-        </p:style>
-        <p:txBody>
-          <a:bodyPr/>
-          <a:lstStyle/>
-          <a:p>
-            <a:endParaRPr lang="en-US" dirty="0"/>
-          </a:p>
-        </p:txBody>
-      </p:sp>
-      <p:sp>
-        <p:nvSpPr>
-          <p:cNvPr id="2" name="Title 1">
-            <a:extLst>
-              <a:ext uri="{FF2B5EF4-FFF2-40B4-BE49-F238E27FC236}">
-                <a16:creationId xmlns:a16="http://schemas.microsoft.com/office/drawing/2014/main" id="{90CC6BE5-276A-02D2-3E28-30E82DE7723D}"/>
-              </a:ext>
-            </a:extLst>
-          </p:cNvPr>
-          <p:cNvSpPr>
-            <a:spLocks noGrp="1"/>
-          </p:cNvSpPr>
-          <p:nvPr>
-            <p:ph type="title"/>
-          </p:nvPr>
-        </p:nvSpPr>
-        <p:spPr>
-          <a:xfrm>
-            <a:off x="847703" y="895350"/>
-            <a:ext cx="2394787" cy="3524250"/>
-          </a:xfrm>
-        </p:spPr>
-        <p:txBody>
-          <a:bodyPr anchor="ctr">
-            <a:normAutofit/>
-          </a:bodyPr>
-          <a:lstStyle/>
-          <a:p>
-            <a:r>
-              <a:rPr lang="en-US" dirty="0"/>
-              <a:t>Productivity Tips</a:t>
-            </a:r>
-          </a:p>
-        </p:txBody>
-      </p:sp>
-      <p:cxnSp>
-        <p:nvCxnSpPr>
-          <p:cNvPr id="17" name="Straight Connector 16">
-            <a:extLst>
-              <a:ext uri="{FF2B5EF4-FFF2-40B4-BE49-F238E27FC236}">
-                <a16:creationId xmlns:a16="http://schemas.microsoft.com/office/drawing/2014/main" id="{D33AC32D-5F44-45F7-A0BD-7C11A86BED57}"/>
-              </a:ext>
-              <a:ext uri="{C183D7F6-B498-43B3-948B-1728B52AA6E4}">
-                <adec:decorative xmlns:adec="http://schemas.microsoft.com/office/drawing/2017/decorative" val="1"/>
-              </a:ext>
-            </a:extLst>
-          </p:cNvPr>
-          <p:cNvCxnSpPr>
-            <a:cxnSpLocks noGrp="1" noRot="1" noChangeAspect="1" noMove="1" noResize="1" noEditPoints="1" noAdjustHandles="1" noChangeArrowheads="1" noChangeShapeType="1"/>
-          </p:cNvCxnSpPr>
-          <p:nvPr>
-            <p:extLst>
-              <p:ext uri="{386F3935-93C4-4BCD-93E2-E3B085C9AB24}">
-                <p16:designElem xmlns:p16="http://schemas.microsoft.com/office/powerpoint/2015/main" val="1"/>
-              </p:ext>
-            </p:extLst>
-          </p:nvPr>
-        </p:nvCxnSpPr>
-        <p:spPr>
-          <a:xfrm>
-            <a:off x="3490722" y="1200150"/>
-            <a:ext cx="0" cy="2743200"/>
-          </a:xfrm>
-          <a:prstGeom prst="line">
-            <a:avLst/>
-          </a:prstGeom>
-          <a:ln w="31750">
-            <a:solidFill>
-              <a:schemeClr val="tx1">
-                <a:alpha val="80000"/>
-              </a:schemeClr>
-            </a:solidFill>
-          </a:ln>
-        </p:spPr>
-        <p:style>
-          <a:lnRef idx="1">
-            <a:schemeClr val="accent1"/>
-          </a:lnRef>
-          <a:fillRef idx="0">
-            <a:schemeClr val="accent1"/>
-          </a:fillRef>
-          <a:effectRef idx="0">
-            <a:schemeClr val="accent1"/>
-          </a:effectRef>
-          <a:fontRef idx="minor">
-            <a:schemeClr val="tx1"/>
-          </a:fontRef>
-        </p:style>
-      </p:cxnSp>
-      <p:sp>
-        <p:nvSpPr>
-          <p:cNvPr id="3" name="Content Placeholder 2">
-            <a:extLst>
-              <a:ext uri="{FF2B5EF4-FFF2-40B4-BE49-F238E27FC236}">
-                <a16:creationId xmlns:a16="http://schemas.microsoft.com/office/drawing/2014/main" id="{CFA3B380-E5F0-5EAE-FE2C-3DB010BB4B1C}"/>
-              </a:ext>
-            </a:extLst>
-          </p:cNvPr>
-          <p:cNvSpPr>
-            <a:spLocks noGrp="1"/>
-          </p:cNvSpPr>
-          <p:nvPr>
-            <p:ph idx="1"/>
-          </p:nvPr>
-        </p:nvSpPr>
-        <p:spPr>
-          <a:xfrm>
-            <a:off x="3732477" y="895350"/>
-            <a:ext cx="4563818" cy="3524250"/>
-          </a:xfrm>
-        </p:spPr>
-        <p:txBody>
-          <a:bodyPr anchor="ctr">
-            <a:normAutofit/>
-          </a:bodyPr>
-          <a:lstStyle/>
-          <a:p>
-            <a:r>
-              <a:rPr lang="en-US"/>
-              <a:t>Hot Reload Feature</a:t>
-            </a:r>
-          </a:p>
-          <a:p>
-            <a:pPr lvl="1"/>
-            <a:r>
-              <a:rPr lang="en-US"/>
-              <a:t>XAML Hot Reload &amp; .NET Hot Reload enable instant code and markup changes, speeding up development &amp; reducing testing time.</a:t>
-            </a:r>
-          </a:p>
-          <a:p>
-            <a:r>
-              <a:rPr lang="en-US"/>
-              <a:t>Use of Templates</a:t>
-            </a:r>
-          </a:p>
-          <a:p>
-            <a:pPr lvl="1"/>
-            <a:r>
-              <a:rPr lang="en-US"/>
-              <a:t>Templates provide reusable structures, enhancing consistency &amp; saving time coding.</a:t>
-            </a:r>
-          </a:p>
-          <a:p>
-            <a:r>
-              <a:rPr lang="en-US"/>
-              <a:t>Extensions for Quality</a:t>
-            </a:r>
-          </a:p>
-          <a:p>
-            <a:pPr lvl="1"/>
-            <a:r>
-              <a:rPr lang="en-US"/>
-              <a:t>Visual Studio &amp; VS Code extensions add functionality &amp; help maintain high code quality across platforms.</a:t>
-            </a:r>
-          </a:p>
-        </p:txBody>
-      </p:sp>
-      <p:sp>
-        <p:nvSpPr>
-          <p:cNvPr id="19" name="Date Placeholder 1">
-            <a:extLst>
-              <a:ext uri="{FF2B5EF4-FFF2-40B4-BE49-F238E27FC236}">
-                <a16:creationId xmlns:a16="http://schemas.microsoft.com/office/drawing/2014/main" id="{3FBF03E8-C602-4192-9C52-F84B29FDCC88}"/>
-              </a:ext>
-              <a:ext uri="{C183D7F6-B498-43B3-948B-1728B52AA6E4}">
-                <adec:decorative xmlns:adec="http://schemas.microsoft.com/office/drawing/2017/decorative" val="1"/>
-              </a:ext>
-            </a:extLst>
-          </p:cNvPr>
-          <p:cNvSpPr txBox="1">
-            <a:spLocks noGrp="1" noRot="1" noChangeAspect="1" noMove="1" noResize="1" noEditPoints="1" noAdjustHandles="1" noChangeArrowheads="1" noChangeShapeType="1" noTextEdit="1"/>
-          </p:cNvSpPr>
-          <p:nvPr>
-            <p:extLst>
-              <p:ext uri="{386F3935-93C4-4BCD-93E2-E3B085C9AB24}">
-                <p16:designElem xmlns:p16="http://schemas.microsoft.com/office/powerpoint/2015/main" val="1"/>
-              </p:ext>
-            </p:extLst>
-          </p:nvPr>
-        </p:nvSpPr>
-        <p:spPr>
-          <a:xfrm>
-            <a:off x="5792421" y="4505908"/>
-            <a:ext cx="2625537" cy="231901"/>
-          </a:xfrm>
-          <a:prstGeom prst="rect">
-            <a:avLst/>
-          </a:prstGeom>
-        </p:spPr>
-        <p:txBody>
-          <a:bodyPr vert="horz" lIns="91440" tIns="45720" rIns="91440" bIns="45720" rtlCol="0" anchor="ctr"/>
-          <a:lstStyle>
-            <a:defPPr>
-              <a:defRPr lang="en-US"/>
-            </a:defPPr>
-            <a:lvl1pPr marL="0" algn="r" defTabSz="457200" rtl="0" eaLnBrk="1" latinLnBrk="0" hangingPunct="1">
-              <a:defRPr sz="1200" kern="1200">
-                <a:solidFill>
-                  <a:schemeClr val="tx1">
-                    <a:tint val="75000"/>
-                  </a:schemeClr>
-                </a:solidFill>
-                <a:latin typeface="+mn-lt"/>
-                <a:ea typeface="+mn-ea"/>
-                <a:cs typeface="+mn-cs"/>
-              </a:defRPr>
-            </a:lvl1pPr>
-            <a:lvl2pPr marL="457200" algn="l" defTabSz="457200" rtl="0" eaLnBrk="1" latinLnBrk="0" hangingPunct="1">
-              <a:defRPr sz="1800" kern="1200">
-                <a:solidFill>
-                  <a:schemeClr val="tx1"/>
-                </a:solidFill>
-                <a:latin typeface="+mn-lt"/>
-                <a:ea typeface="+mn-ea"/>
-                <a:cs typeface="+mn-cs"/>
-              </a:defRPr>
-            </a:lvl2pPr>
-            <a:lvl3pPr marL="914400" algn="l" defTabSz="457200" rtl="0" eaLnBrk="1" latinLnBrk="0" hangingPunct="1">
-              <a:defRPr sz="1800" kern="1200">
-                <a:solidFill>
-                  <a:schemeClr val="tx1"/>
-                </a:solidFill>
-                <a:latin typeface="+mn-lt"/>
-                <a:ea typeface="+mn-ea"/>
-                <a:cs typeface="+mn-cs"/>
-              </a:defRPr>
-            </a:lvl3pPr>
-            <a:lvl4pPr marL="1371600" algn="l" defTabSz="457200" rtl="0" eaLnBrk="1" latinLnBrk="0" hangingPunct="1">
-              <a:defRPr sz="1800" kern="1200">
-                <a:solidFill>
-                  <a:schemeClr val="tx1"/>
-                </a:solidFill>
-                <a:latin typeface="+mn-lt"/>
-                <a:ea typeface="+mn-ea"/>
-                <a:cs typeface="+mn-cs"/>
-              </a:defRPr>
-            </a:lvl4pPr>
-            <a:lvl5pPr marL="1828800" algn="l" defTabSz="457200" rtl="0" eaLnBrk="1" latinLnBrk="0" hangingPunct="1">
-              <a:defRPr sz="1800" kern="1200">
-                <a:solidFill>
-                  <a:schemeClr val="tx1"/>
-                </a:solidFill>
-                <a:latin typeface="+mn-lt"/>
-                <a:ea typeface="+mn-ea"/>
-                <a:cs typeface="+mn-cs"/>
-              </a:defRPr>
-            </a:lvl5pPr>
-            <a:lvl6pPr marL="2286000" algn="l" defTabSz="457200" rtl="0" eaLnBrk="1" latinLnBrk="0" hangingPunct="1">
-              <a:defRPr sz="1800" kern="1200">
-                <a:solidFill>
-                  <a:schemeClr val="tx1"/>
-                </a:solidFill>
-                <a:latin typeface="+mn-lt"/>
-                <a:ea typeface="+mn-ea"/>
-                <a:cs typeface="+mn-cs"/>
-              </a:defRPr>
-            </a:lvl6pPr>
-            <a:lvl7pPr marL="2743200" algn="l" defTabSz="457200" rtl="0" eaLnBrk="1" latinLnBrk="0" hangingPunct="1">
-              <a:defRPr sz="1800" kern="1200">
-                <a:solidFill>
-                  <a:schemeClr val="tx1"/>
-                </a:solidFill>
-                <a:latin typeface="+mn-lt"/>
-                <a:ea typeface="+mn-ea"/>
-                <a:cs typeface="+mn-cs"/>
-              </a:defRPr>
-            </a:lvl7pPr>
-            <a:lvl8pPr marL="3200400" algn="l" defTabSz="457200" rtl="0" eaLnBrk="1" latinLnBrk="0" hangingPunct="1">
-              <a:defRPr sz="1800" kern="1200">
-                <a:solidFill>
-                  <a:schemeClr val="tx1"/>
-                </a:solidFill>
-                <a:latin typeface="+mn-lt"/>
-                <a:ea typeface="+mn-ea"/>
-                <a:cs typeface="+mn-cs"/>
-              </a:defRPr>
-            </a:lvl8pPr>
-            <a:lvl9pPr marL="3657600" algn="l" defTabSz="457200" rtl="0" eaLnBrk="1" latinLnBrk="0" hangingPunct="1">
-              <a:defRPr sz="1800" kern="1200">
-                <a:solidFill>
-                  <a:schemeClr val="tx1"/>
-                </a:solidFill>
-                <a:latin typeface="+mn-lt"/>
-                <a:ea typeface="+mn-ea"/>
-                <a:cs typeface="+mn-cs"/>
-              </a:defRPr>
-            </a:lvl9pPr>
-          </a:lstStyle>
-          <a:p>
-            <a:endParaRPr lang="en-US" dirty="0">
-              <a:solidFill>
-                <a:schemeClr val="tx1"/>
-              </a:solidFill>
-            </a:endParaRPr>
-          </a:p>
-        </p:txBody>
-      </p:sp>
-    </p:spTree>
-    <p:extLst>
-      <p:ext uri="{BB962C8B-B14F-4D97-AF65-F5344CB8AC3E}">
-        <p14:creationId xmlns:p14="http://schemas.microsoft.com/office/powerpoint/2010/main" val="2695737749"/>
       </p:ext>
     </p:extLst>
   </p:cSld>

</xml_diff>

<commit_message>
Add codemash feedback QR code to maui slide deck
</commit_message>
<xml_diff>
--- a/2026/0115_CodeMash/Maui Toolkit/Create Multi-Platform Apps with .NET.pptx
+++ b/2026/0115_CodeMash/Maui Toolkit/Create Multi-Platform Apps with .NET.pptx
@@ -16428,7 +16428,7 @@
               <a:pPr>
                 <a:defRPr/>
               </a:pPr>
-              <a:t>1/5/2026</a:t>
+              <a:t>1/6/2026</a:t>
             </a:fld>
             <a:endParaRPr lang="en-US"/>
           </a:p>
@@ -18063,7 +18063,7 @@
               <a:pPr>
                 <a:defRPr/>
               </a:pPr>
-              <a:t>1/5/2026</a:t>
+              <a:t>1/6/2026</a:t>
             </a:fld>
             <a:endParaRPr lang="en-US"/>
           </a:p>
@@ -18220,7 +18220,7 @@
               <a:pPr>
                 <a:defRPr/>
               </a:pPr>
-              <a:t>1/5/2026</a:t>
+              <a:t>1/6/2026</a:t>
             </a:fld>
             <a:endParaRPr lang="en-US"/>
           </a:p>
@@ -18387,7 +18387,7 @@
               <a:pPr>
                 <a:defRPr/>
               </a:pPr>
-              <a:t>1/5/2026</a:t>
+              <a:t>1/6/2026</a:t>
             </a:fld>
             <a:endParaRPr lang="en-US"/>
           </a:p>
@@ -18617,7 +18617,7 @@
               <a:pPr>
                 <a:defRPr/>
               </a:pPr>
-              <a:t>1/5/2026</a:t>
+              <a:t>1/6/2026</a:t>
             </a:fld>
             <a:endParaRPr lang="en-US"/>
           </a:p>
@@ -18784,7 +18784,7 @@
               <a:pPr>
                 <a:defRPr/>
               </a:pPr>
-              <a:t>1/5/2026</a:t>
+              <a:t>1/6/2026</a:t>
             </a:fld>
             <a:endParaRPr lang="en-US" dirty="0"/>
           </a:p>
@@ -19018,7 +19018,7 @@
               <a:pPr>
                 <a:defRPr/>
               </a:pPr>
-              <a:t>1/5/2026</a:t>
+              <a:t>1/6/2026</a:t>
             </a:fld>
             <a:endParaRPr lang="en-US"/>
           </a:p>
@@ -19292,7 +19292,7 @@
               <a:pPr>
                 <a:defRPr/>
               </a:pPr>
-              <a:t>1/5/2026</a:t>
+              <a:t>1/6/2026</a:t>
             </a:fld>
             <a:endParaRPr lang="en-US"/>
           </a:p>
@@ -19705,7 +19705,7 @@
               <a:pPr>
                 <a:defRPr/>
               </a:pPr>
-              <a:t>1/5/2026</a:t>
+              <a:t>1/6/2026</a:t>
             </a:fld>
             <a:endParaRPr lang="en-US"/>
           </a:p>
@@ -19811,7 +19811,7 @@
               <a:pPr>
                 <a:defRPr/>
               </a:pPr>
-              <a:t>1/5/2026</a:t>
+              <a:t>1/6/2026</a:t>
             </a:fld>
             <a:endParaRPr lang="en-US"/>
           </a:p>
@@ -19895,7 +19895,7 @@
               <a:pPr>
                 <a:defRPr/>
               </a:pPr>
-              <a:t>1/5/2026</a:t>
+              <a:t>1/6/2026</a:t>
             </a:fld>
             <a:endParaRPr lang="en-US"/>
           </a:p>
@@ -20159,7 +20159,7 @@
               <a:pPr>
                 <a:defRPr/>
               </a:pPr>
-              <a:t>1/5/2026</a:t>
+              <a:t>1/6/2026</a:t>
             </a:fld>
             <a:endParaRPr lang="en-US"/>
           </a:p>
@@ -20324,7 +20324,7 @@
               <a:pPr>
                 <a:defRPr/>
               </a:pPr>
-              <a:t>1/5/2026</a:t>
+              <a:t>1/6/2026</a:t>
             </a:fld>
             <a:endParaRPr lang="en-US" dirty="0"/>
           </a:p>
@@ -20571,7 +20571,7 @@
               <a:pPr>
                 <a:defRPr/>
               </a:pPr>
-              <a:t>1/5/2026</a:t>
+              <a:t>1/6/2026</a:t>
             </a:fld>
             <a:endParaRPr lang="en-US"/>
           </a:p>
@@ -20728,7 +20728,7 @@
               <a:pPr>
                 <a:defRPr/>
               </a:pPr>
-              <a:t>1/5/2026</a:t>
+              <a:t>1/6/2026</a:t>
             </a:fld>
             <a:endParaRPr lang="en-US"/>
           </a:p>
@@ -20895,7 +20895,7 @@
               <a:pPr>
                 <a:defRPr/>
               </a:pPr>
-              <a:t>1/5/2026</a:t>
+              <a:t>1/6/2026</a:t>
             </a:fld>
             <a:endParaRPr lang="en-US"/>
           </a:p>
@@ -21080,7 +21080,7 @@
               <a:pPr>
                 <a:defRPr/>
               </a:pPr>
-              <a:t>1/5/2026</a:t>
+              <a:t>1/6/2026</a:t>
             </a:fld>
             <a:endParaRPr lang="en-US"/>
           </a:p>
@@ -21301,7 +21301,7 @@
               <a:pPr>
                 <a:defRPr/>
               </a:pPr>
-              <a:t>1/5/2026</a:t>
+              <a:t>1/6/2026</a:t>
             </a:fld>
             <a:endParaRPr lang="en-US"/>
           </a:p>
@@ -21590,7 +21590,7 @@
               <a:pPr>
                 <a:defRPr/>
               </a:pPr>
-              <a:t>1/5/2026</a:t>
+              <a:t>1/6/2026</a:t>
             </a:fld>
             <a:endParaRPr lang="en-US"/>
           </a:p>
@@ -21868,7 +21868,7 @@
               <a:pPr>
                 <a:defRPr/>
               </a:pPr>
-              <a:t>1/5/2026</a:t>
+              <a:t>1/6/2026</a:t>
             </a:fld>
             <a:endParaRPr lang="en-US"/>
           </a:p>
@@ -22294,7 +22294,7 @@
               <a:pPr>
                 <a:defRPr/>
               </a:pPr>
-              <a:t>1/5/2026</a:t>
+              <a:t>1/6/2026</a:t>
             </a:fld>
             <a:endParaRPr lang="en-US"/>
           </a:p>
@@ -22453,7 +22453,7 @@
               <a:pPr>
                 <a:defRPr/>
               </a:pPr>
-              <a:t>1/5/2026</a:t>
+              <a:t>1/6/2026</a:t>
             </a:fld>
             <a:endParaRPr lang="en-US"/>
           </a:p>
@@ -22589,7 +22589,7 @@
               <a:pPr>
                 <a:defRPr/>
               </a:pPr>
-              <a:t>1/5/2026</a:t>
+              <a:t>1/6/2026</a:t>
             </a:fld>
             <a:endParaRPr lang="en-US"/>
           </a:p>
@@ -22848,7 +22848,7 @@
               <a:pPr>
                 <a:defRPr/>
               </a:pPr>
-              <a:t>1/5/2026</a:t>
+              <a:t>1/6/2026</a:t>
             </a:fld>
             <a:endParaRPr lang="en-US"/>
           </a:p>
@@ -23084,7 +23084,7 @@
               <a:pPr>
                 <a:defRPr/>
               </a:pPr>
-              <a:t>1/5/2026</a:t>
+              <a:t>1/6/2026</a:t>
             </a:fld>
             <a:endParaRPr lang="en-US"/>
           </a:p>
@@ -23539,7 +23539,7 @@
               <a:pPr>
                 <a:defRPr/>
               </a:pPr>
-              <a:t>1/5/2026</a:t>
+              <a:t>1/6/2026</a:t>
             </a:fld>
             <a:endParaRPr lang="en-US"/>
           </a:p>
@@ -23755,7 +23755,7 @@
               <a:pPr>
                 <a:defRPr/>
               </a:pPr>
-              <a:t>1/5/2026</a:t>
+              <a:t>1/6/2026</a:t>
             </a:fld>
             <a:endParaRPr lang="en-US"/>
           </a:p>
@@ -23980,7 +23980,7 @@
               <a:pPr>
                 <a:defRPr/>
               </a:pPr>
-              <a:t>1/5/2026</a:t>
+              <a:t>1/6/2026</a:t>
             </a:fld>
             <a:endParaRPr lang="en-US"/>
           </a:p>
@@ -24310,7 +24310,7 @@
               <a:pPr>
                 <a:defRPr/>
               </a:pPr>
-              <a:t>1/5/2026</a:t>
+              <a:t>1/6/2026</a:t>
             </a:fld>
             <a:endParaRPr lang="en-US"/>
           </a:p>
@@ -24723,7 +24723,7 @@
               <a:pPr>
                 <a:defRPr/>
               </a:pPr>
-              <a:t>1/5/2026</a:t>
+              <a:t>1/6/2026</a:t>
             </a:fld>
             <a:endParaRPr lang="en-US"/>
           </a:p>
@@ -24829,7 +24829,7 @@
               <a:pPr>
                 <a:defRPr/>
               </a:pPr>
-              <a:t>1/5/2026</a:t>
+              <a:t>1/6/2026</a:t>
             </a:fld>
             <a:endParaRPr lang="en-US"/>
           </a:p>
@@ -24913,7 +24913,7 @@
               <a:pPr>
                 <a:defRPr/>
               </a:pPr>
-              <a:t>1/5/2026</a:t>
+              <a:t>1/6/2026</a:t>
             </a:fld>
             <a:endParaRPr lang="en-US"/>
           </a:p>
@@ -25177,7 +25177,7 @@
               <a:pPr>
                 <a:defRPr/>
               </a:pPr>
-              <a:t>1/5/2026</a:t>
+              <a:t>1/6/2026</a:t>
             </a:fld>
             <a:endParaRPr lang="en-US"/>
           </a:p>
@@ -25421,7 +25421,7 @@
               <a:pPr>
                 <a:defRPr/>
               </a:pPr>
-              <a:t>1/5/2026</a:t>
+              <a:t>1/6/2026</a:t>
             </a:fld>
             <a:endParaRPr lang="en-US"/>
           </a:p>
@@ -25654,7 +25654,7 @@
               <a:pPr>
                 <a:defRPr/>
               </a:pPr>
-              <a:t>1/5/2026</a:t>
+              <a:t>1/6/2026</a:t>
             </a:fld>
             <a:endParaRPr lang="en-US"/>
           </a:p>
@@ -26333,7 +26333,7 @@
               <a:pPr>
                 <a:defRPr/>
               </a:pPr>
-              <a:t>1/5/2026</a:t>
+              <a:t>1/6/2026</a:t>
             </a:fld>
             <a:endParaRPr lang="en-US"/>
           </a:p>
@@ -27060,7 +27060,7 @@
               <a:pPr>
                 <a:defRPr/>
               </a:pPr>
-              <a:t>1/5/2026</a:t>
+              <a:t>1/6/2026</a:t>
             </a:fld>
             <a:endParaRPr lang="en-US"/>
           </a:p>
@@ -34531,20 +34531,20 @@
         <a:gradFill rotWithShape="1">
           <a:gsLst>
             <a:gs pos="0">
-              <a:schemeClr val="bg1">
+              <a:schemeClr val="bg2">
                 <a:tint val="94000"/>
                 <a:satMod val="80000"/>
                 <a:lumMod val="106000"/>
               </a:schemeClr>
             </a:gs>
             <a:gs pos="100000">
-              <a:schemeClr val="bg1">
+              <a:schemeClr val="bg2">
                 <a:shade val="80000"/>
               </a:schemeClr>
             </a:gs>
           </a:gsLst>
           <a:path path="circle">
-            <a:fillToRect l="50000" t="50000" r="50000" b="50000"/>
+            <a:fillToRect l="43000" r="43000" b="100000"/>
           </a:path>
         </a:gradFill>
         <a:effectLst/>
@@ -34617,58 +34617,107 @@
         </p:nvSpPr>
         <p:spPr>
           <a:xfrm>
-            <a:off x="1088684" y="1511799"/>
-            <a:ext cx="7202456" cy="2587959"/>
+            <a:off x="1088684" y="1511800"/>
+            <a:ext cx="4646838" cy="2587960"/>
           </a:xfrm>
         </p:spPr>
         <p:txBody>
           <a:bodyPr>
-            <a:normAutofit/>
+            <a:normAutofit lnSpcReduction="10000"/>
           </a:bodyPr>
           <a:lstStyle/>
           <a:p>
             <a:r>
-              <a:rPr lang="en-US"/>
+              <a:rPr lang="en-US" dirty="0"/>
               <a:t>Questions about .NET MAUI &amp; the Community Toolkits?</a:t>
             </a:r>
           </a:p>
           <a:p>
             <a:r>
-              <a:rPr lang="en-US"/>
+              <a:rPr lang="en-US" dirty="0"/>
               <a:t>General Cross-Platform Dev Questions?</a:t>
             </a:r>
           </a:p>
           <a:p>
             <a:r>
-              <a:rPr lang="en-US"/>
+              <a:rPr lang="en-US" dirty="0"/>
+              <a:t>Feedback </a:t>
+            </a:r>
+            <a:r>
+              <a:rPr lang="en-US" dirty="0">
+                <a:sym typeface="Wingdings" panose="05000000000000000000" pitchFamily="2" charset="2"/>
+              </a:rPr>
+              <a:t></a:t>
+            </a:r>
+            <a:endParaRPr lang="en-US" dirty="0"/>
+          </a:p>
+          <a:p>
+            <a:r>
+              <a:rPr lang="en-US" dirty="0"/>
               <a:t>Follow up later:</a:t>
             </a:r>
           </a:p>
           <a:p>
             <a:pPr lvl="1"/>
             <a:r>
-              <a:rPr lang="en-US">
+              <a:rPr lang="en-US" dirty="0">
                 <a:hlinkClick r:id="rId2"/>
               </a:rPr>
               <a:t>alashcraft@gmail.com</a:t>
             </a:r>
-            <a:endParaRPr lang="en-US"/>
+            <a:endParaRPr lang="en-US" dirty="0"/>
           </a:p>
           <a:p>
             <a:pPr lvl="1"/>
             <a:r>
-              <a:rPr lang="en-US"/>
+              <a:rPr lang="en-US" dirty="0"/>
               <a:t>Find me on BlueSky and LinkedIn</a:t>
             </a:r>
           </a:p>
           <a:p>
             <a:r>
-              <a:rPr lang="en-US"/>
+              <a:rPr lang="en-US" dirty="0"/>
               <a:t>Thank you!</a:t>
             </a:r>
           </a:p>
         </p:txBody>
       </p:sp>
+      <p:pic>
+        <p:nvPicPr>
+          <p:cNvPr id="5" name="Picture 4">
+            <a:extLst>
+              <a:ext uri="{FF2B5EF4-FFF2-40B4-BE49-F238E27FC236}">
+                <a16:creationId xmlns:a16="http://schemas.microsoft.com/office/drawing/2014/main" id="{8DBF5226-2B95-DF96-9826-105EDFE3C35F}"/>
+              </a:ext>
+            </a:extLst>
+          </p:cNvPr>
+          <p:cNvPicPr>
+            <a:picLocks noChangeAspect="1"/>
+          </p:cNvPicPr>
+          <p:nvPr/>
+        </p:nvPicPr>
+        <p:blipFill>
+          <a:blip r:embed="rId3" cstate="print">
+            <a:extLst>
+              <a:ext uri="{28A0092B-C50C-407E-A947-70E740481C1C}">
+                <a14:useLocalDpi xmlns:a14="http://schemas.microsoft.com/office/drawing/2010/main" val="0"/>
+              </a:ext>
+            </a:extLst>
+          </a:blip>
+          <a:stretch>
+            <a:fillRect/>
+          </a:stretch>
+        </p:blipFill>
+        <p:spPr>
+          <a:xfrm>
+            <a:off x="6096567" y="1674557"/>
+            <a:ext cx="2194573" cy="2262446"/>
+          </a:xfrm>
+          <a:prstGeom prst="rect">
+            <a:avLst/>
+          </a:prstGeom>
+        </p:spPr>
+      </p:pic>
     </p:spTree>
     <p:extLst>
       <p:ext uri="{BB962C8B-B14F-4D97-AF65-F5344CB8AC3E}">
@@ -34677,7 +34726,7 @@
     </p:extLst>
   </p:cSld>
   <p:clrMapOvr>
-    <a:overrideClrMapping bg1="dk1" tx1="lt1" bg2="dk2" tx2="lt2" accent1="accent1" accent2="accent2" accent3="accent3" accent4="accent4" accent5="accent5" accent6="accent6" hlink="hlink" folHlink="folHlink"/>
+    <a:masterClrMapping/>
   </p:clrMapOvr>
 </p:sld>
 </file>

</xml_diff>

<commit_message>
Enable live captions for codemash maui slide deck
</commit_message>
<xml_diff>
--- a/2026/0115_CodeMash/Maui Toolkit/Create Multi-Platform Apps with .NET.pptx
+++ b/2026/0115_CodeMash/Maui Toolkit/Create Multi-Platform Apps with .NET.pptx
@@ -16429,7 +16429,7 @@
               <a:pPr>
                 <a:defRPr/>
               </a:pPr>
-              <a:t>1/10/2026</a:t>
+              <a:t>1/13/2026</a:t>
             </a:fld>
             <a:endParaRPr lang="en-US"/>
           </a:p>
@@ -25002,7 +25002,7 @@
               <a:pPr>
                 <a:defRPr/>
               </a:pPr>
-              <a:t>1/10/2026</a:t>
+              <a:t>1/13/2026</a:t>
             </a:fld>
             <a:endParaRPr lang="en-US"/>
           </a:p>
@@ -25159,7 +25159,7 @@
               <a:pPr>
                 <a:defRPr/>
               </a:pPr>
-              <a:t>1/10/2026</a:t>
+              <a:t>1/13/2026</a:t>
             </a:fld>
             <a:endParaRPr lang="en-US"/>
           </a:p>
@@ -25326,7 +25326,7 @@
               <a:pPr>
                 <a:defRPr/>
               </a:pPr>
-              <a:t>1/10/2026</a:t>
+              <a:t>1/13/2026</a:t>
             </a:fld>
             <a:endParaRPr lang="en-US"/>
           </a:p>
@@ -25556,7 +25556,7 @@
               <a:pPr>
                 <a:defRPr/>
               </a:pPr>
-              <a:t>1/10/2026</a:t>
+              <a:t>1/13/2026</a:t>
             </a:fld>
             <a:endParaRPr lang="en-US"/>
           </a:p>
@@ -25723,7 +25723,7 @@
               <a:pPr>
                 <a:defRPr/>
               </a:pPr>
-              <a:t>1/10/2026</a:t>
+              <a:t>1/13/2026</a:t>
             </a:fld>
             <a:endParaRPr lang="en-US" dirty="0"/>
           </a:p>
@@ -25957,7 +25957,7 @@
               <a:pPr>
                 <a:defRPr/>
               </a:pPr>
-              <a:t>1/10/2026</a:t>
+              <a:t>1/13/2026</a:t>
             </a:fld>
             <a:endParaRPr lang="en-US"/>
           </a:p>
@@ -26231,7 +26231,7 @@
               <a:pPr>
                 <a:defRPr/>
               </a:pPr>
-              <a:t>1/10/2026</a:t>
+              <a:t>1/13/2026</a:t>
             </a:fld>
             <a:endParaRPr lang="en-US"/>
           </a:p>
@@ -26644,7 +26644,7 @@
               <a:pPr>
                 <a:defRPr/>
               </a:pPr>
-              <a:t>1/10/2026</a:t>
+              <a:t>1/13/2026</a:t>
             </a:fld>
             <a:endParaRPr lang="en-US"/>
           </a:p>
@@ -26750,7 +26750,7 @@
               <a:pPr>
                 <a:defRPr/>
               </a:pPr>
-              <a:t>1/10/2026</a:t>
+              <a:t>1/13/2026</a:t>
             </a:fld>
             <a:endParaRPr lang="en-US"/>
           </a:p>
@@ -26834,7 +26834,7 @@
               <a:pPr>
                 <a:defRPr/>
               </a:pPr>
-              <a:t>1/10/2026</a:t>
+              <a:t>1/13/2026</a:t>
             </a:fld>
             <a:endParaRPr lang="en-US"/>
           </a:p>
@@ -27098,7 +27098,7 @@
               <a:pPr>
                 <a:defRPr/>
               </a:pPr>
-              <a:t>1/10/2026</a:t>
+              <a:t>1/13/2026</a:t>
             </a:fld>
             <a:endParaRPr lang="en-US"/>
           </a:p>
@@ -27263,7 +27263,7 @@
               <a:pPr>
                 <a:defRPr/>
               </a:pPr>
-              <a:t>1/10/2026</a:t>
+              <a:t>1/13/2026</a:t>
             </a:fld>
             <a:endParaRPr lang="en-US" dirty="0"/>
           </a:p>
@@ -27510,7 +27510,7 @@
               <a:pPr>
                 <a:defRPr/>
               </a:pPr>
-              <a:t>1/10/2026</a:t>
+              <a:t>1/13/2026</a:t>
             </a:fld>
             <a:endParaRPr lang="en-US"/>
           </a:p>
@@ -27667,7 +27667,7 @@
               <a:pPr>
                 <a:defRPr/>
               </a:pPr>
-              <a:t>1/10/2026</a:t>
+              <a:t>1/13/2026</a:t>
             </a:fld>
             <a:endParaRPr lang="en-US"/>
           </a:p>
@@ -27834,7 +27834,7 @@
               <a:pPr>
                 <a:defRPr/>
               </a:pPr>
-              <a:t>1/10/2026</a:t>
+              <a:t>1/13/2026</a:t>
             </a:fld>
             <a:endParaRPr lang="en-US"/>
           </a:p>
@@ -28019,7 +28019,7 @@
               <a:pPr>
                 <a:defRPr/>
               </a:pPr>
-              <a:t>1/10/2026</a:t>
+              <a:t>1/13/2026</a:t>
             </a:fld>
             <a:endParaRPr lang="en-US"/>
           </a:p>
@@ -28240,7 +28240,7 @@
               <a:pPr>
                 <a:defRPr/>
               </a:pPr>
-              <a:t>1/10/2026</a:t>
+              <a:t>1/13/2026</a:t>
             </a:fld>
             <a:endParaRPr lang="en-US"/>
           </a:p>
@@ -28529,7 +28529,7 @@
               <a:pPr>
                 <a:defRPr/>
               </a:pPr>
-              <a:t>1/10/2026</a:t>
+              <a:t>1/13/2026</a:t>
             </a:fld>
             <a:endParaRPr lang="en-US"/>
           </a:p>
@@ -28807,7 +28807,7 @@
               <a:pPr>
                 <a:defRPr/>
               </a:pPr>
-              <a:t>1/10/2026</a:t>
+              <a:t>1/13/2026</a:t>
             </a:fld>
             <a:endParaRPr lang="en-US"/>
           </a:p>
@@ -29233,7 +29233,7 @@
               <a:pPr>
                 <a:defRPr/>
               </a:pPr>
-              <a:t>1/10/2026</a:t>
+              <a:t>1/13/2026</a:t>
             </a:fld>
             <a:endParaRPr lang="en-US"/>
           </a:p>
@@ -29392,7 +29392,7 @@
               <a:pPr>
                 <a:defRPr/>
               </a:pPr>
-              <a:t>1/10/2026</a:t>
+              <a:t>1/13/2026</a:t>
             </a:fld>
             <a:endParaRPr lang="en-US"/>
           </a:p>
@@ -29528,7 +29528,7 @@
               <a:pPr>
                 <a:defRPr/>
               </a:pPr>
-              <a:t>1/10/2026</a:t>
+              <a:t>1/13/2026</a:t>
             </a:fld>
             <a:endParaRPr lang="en-US"/>
           </a:p>
@@ -29787,7 +29787,7 @@
               <a:pPr>
                 <a:defRPr/>
               </a:pPr>
-              <a:t>1/10/2026</a:t>
+              <a:t>1/13/2026</a:t>
             </a:fld>
             <a:endParaRPr lang="en-US"/>
           </a:p>
@@ -30023,7 +30023,7 @@
               <a:pPr>
                 <a:defRPr/>
               </a:pPr>
-              <a:t>1/10/2026</a:t>
+              <a:t>1/13/2026</a:t>
             </a:fld>
             <a:endParaRPr lang="en-US"/>
           </a:p>
@@ -30478,7 +30478,7 @@
               <a:pPr>
                 <a:defRPr/>
               </a:pPr>
-              <a:t>1/10/2026</a:t>
+              <a:t>1/13/2026</a:t>
             </a:fld>
             <a:endParaRPr lang="en-US"/>
           </a:p>
@@ -30694,7 +30694,7 @@
               <a:pPr>
                 <a:defRPr/>
               </a:pPr>
-              <a:t>1/10/2026</a:t>
+              <a:t>1/13/2026</a:t>
             </a:fld>
             <a:endParaRPr lang="en-US"/>
           </a:p>
@@ -30919,7 +30919,7 @@
               <a:pPr>
                 <a:defRPr/>
               </a:pPr>
-              <a:t>1/10/2026</a:t>
+              <a:t>1/13/2026</a:t>
             </a:fld>
             <a:endParaRPr lang="en-US"/>
           </a:p>
@@ -31249,7 +31249,7 @@
               <a:pPr>
                 <a:defRPr/>
               </a:pPr>
-              <a:t>1/10/2026</a:t>
+              <a:t>1/13/2026</a:t>
             </a:fld>
             <a:endParaRPr lang="en-US"/>
           </a:p>
@@ -31662,7 +31662,7 @@
               <a:pPr>
                 <a:defRPr/>
               </a:pPr>
-              <a:t>1/10/2026</a:t>
+              <a:t>1/13/2026</a:t>
             </a:fld>
             <a:endParaRPr lang="en-US"/>
           </a:p>
@@ -31768,7 +31768,7 @@
               <a:pPr>
                 <a:defRPr/>
               </a:pPr>
-              <a:t>1/10/2026</a:t>
+              <a:t>1/13/2026</a:t>
             </a:fld>
             <a:endParaRPr lang="en-US"/>
           </a:p>
@@ -31852,7 +31852,7 @@
               <a:pPr>
                 <a:defRPr/>
               </a:pPr>
-              <a:t>1/10/2026</a:t>
+              <a:t>1/13/2026</a:t>
             </a:fld>
             <a:endParaRPr lang="en-US"/>
           </a:p>
@@ -32116,7 +32116,7 @@
               <a:pPr>
                 <a:defRPr/>
               </a:pPr>
-              <a:t>1/10/2026</a:t>
+              <a:t>1/13/2026</a:t>
             </a:fld>
             <a:endParaRPr lang="en-US"/>
           </a:p>
@@ -32360,7 +32360,7 @@
               <a:pPr>
                 <a:defRPr/>
               </a:pPr>
-              <a:t>1/10/2026</a:t>
+              <a:t>1/13/2026</a:t>
             </a:fld>
             <a:endParaRPr lang="en-US"/>
           </a:p>
@@ -32593,7 +32593,7 @@
               <a:pPr>
                 <a:defRPr/>
               </a:pPr>
-              <a:t>1/10/2026</a:t>
+              <a:t>1/13/2026</a:t>
             </a:fld>
             <a:endParaRPr lang="en-US"/>
           </a:p>
@@ -33272,7 +33272,7 @@
               <a:pPr>
                 <a:defRPr/>
               </a:pPr>
-              <a:t>1/10/2026</a:t>
+              <a:t>1/13/2026</a:t>
             </a:fld>
             <a:endParaRPr lang="en-US"/>
           </a:p>
@@ -33999,7 +33999,7 @@
               <a:pPr>
                 <a:defRPr/>
               </a:pPr>
-              <a:t>1/10/2026</a:t>
+              <a:t>1/13/2026</a:t>
             </a:fld>
             <a:endParaRPr lang="en-US"/>
           </a:p>

</xml_diff>

<commit_message>
Fix vslive/codemash maui projects
</commit_message>
<xml_diff>
--- a/2026/0115_CodeMash/Maui Toolkit/Create Multi-Platform Apps with .NET.pptx
+++ b/2026/0115_CodeMash/Maui Toolkit/Create Multi-Platform Apps with .NET.pptx
@@ -4172,8 +4172,8 @@
             <a:defRPr b="1"/>
           </a:pPr>
           <a:r>
-            <a:rPr lang="en-US"/>
-            <a:t>Software industry for nearly 30 years</a:t>
+            <a:rPr lang="en-US" dirty="0"/>
+            <a:t>Software industry for 30+ years</a:t>
           </a:r>
         </a:p>
       </dgm:t>
@@ -6824,8 +6824,8 @@
             <a:defRPr b="1"/>
           </a:pPr>
           <a:r>
-            <a:rPr lang="en-US" sz="1400" kern="1200"/>
-            <a:t>Software industry for nearly 30 years</a:t>
+            <a:rPr lang="en-US" sz="1400" kern="1200" dirty="0"/>
+            <a:t>Software industry for 30+ years</a:t>
           </a:r>
         </a:p>
       </dsp:txBody>
@@ -16429,7 +16429,7 @@
               <a:pPr>
                 <a:defRPr/>
               </a:pPr>
-              <a:t>1/13/2026</a:t>
+              <a:t>1/14/2026</a:t>
             </a:fld>
             <a:endParaRPr lang="en-US"/>
           </a:p>
@@ -22688,7 +22688,7 @@
             </a:r>
             <a:r>
               <a:rPr lang="en-US" dirty="0"/>
-              <a:t> Publishing and I’m co-authoring a new book on Model Context Protocol for .NET developers. You can check those out on </a:t>
+              <a:t> Publishing. You can check those out on </a:t>
             </a:r>
             <a:r>
               <a:rPr lang="en-US" dirty="0" err="1"/>
@@ -24295,7 +24295,7 @@
                 <a:ea typeface="ＭＳ Ｐゴシック" pitchFamily="-72" charset="-128"/>
                 <a:cs typeface="ＭＳ Ｐゴシック" pitchFamily="-72" charset="-128"/>
               </a:rPr>
-              <a:t> (Windows and macOS) and </a:t>
+              <a:t> (Windows) and </a:t>
             </a:r>
             <a:r>
               <a:rPr lang="en-US" sz="1200" b="1" i="0" kern="1200" dirty="0">
@@ -24319,7 +24319,7 @@
                 <a:ea typeface="ＭＳ Ｐゴシック" pitchFamily="-72" charset="-128"/>
                 <a:cs typeface="ＭＳ Ｐゴシック" pitchFamily="-72" charset="-128"/>
               </a:rPr>
-              <a:t> (Windows/macOS), with </a:t>
+              <a:t> (Windows and macOS), with </a:t>
             </a:r>
             <a:r>
               <a:rPr lang="en-US" sz="1200" b="1" i="0" kern="1200" dirty="0">
@@ -24343,7 +24343,7 @@
                 <a:ea typeface="ＭＳ Ｐゴシック" pitchFamily="-72" charset="-128"/>
                 <a:cs typeface="ＭＳ Ｐゴシック" pitchFamily="-72" charset="-128"/>
               </a:rPr>
-              <a:t> as an alternative for those who prefer it. All of them support the .NET MAUI workflows we’ll cover.</a:t>
+              <a:t> as an alternative for Mac and Windows users who prefer it. All of them support the .NET MAUI workflows we’ll cover.</a:t>
             </a:r>
           </a:p>
           <a:p>
@@ -24683,8 +24683,29 @@
                 <a:ea typeface="ＭＳ Ｐゴシック" pitchFamily="-72" charset="-128"/>
                 <a:cs typeface="ＭＳ Ｐゴシック" pitchFamily="-72" charset="-128"/>
               </a:rPr>
-              <a:t>. It’s a good choice when your team standardizes on Rider.</a:t>
-            </a:r>
+              <a:t>. It’s a good choice when your team standardizes on Rider or you need a richer </a:t>
+            </a:r>
+            <a:r>
+              <a:rPr lang="en-US" sz="1200" b="0" i="0" kern="1200">
+                <a:solidFill>
+                  <a:schemeClr val="tx1"/>
+                </a:solidFill>
+                <a:effectLst/>
+                <a:latin typeface="+mn-lt"/>
+                <a:ea typeface="ＭＳ Ｐゴシック" pitchFamily="-72" charset="-128"/>
+                <a:cs typeface="ＭＳ Ｐゴシック" pitchFamily="-72" charset="-128"/>
+              </a:rPr>
+              <a:t>dev experience on macOS.</a:t>
+            </a:r>
+            <a:endParaRPr lang="en-US" sz="1200" b="0" i="0" kern="1200" dirty="0">
+              <a:solidFill>
+                <a:schemeClr val="tx1"/>
+              </a:solidFill>
+              <a:effectLst/>
+              <a:latin typeface="+mn-lt"/>
+              <a:ea typeface="ＭＳ Ｐゴシック" pitchFamily="-72" charset="-128"/>
+              <a:cs typeface="ＭＳ Ｐゴシック" pitchFamily="-72" charset="-128"/>
+            </a:endParaRPr>
           </a:p>
           <a:p>
             <a:pPr marL="0" marR="0" lvl="0" indent="0" algn="l" defTabSz="914400" rtl="0" eaLnBrk="1" fontAlgn="t" latinLnBrk="0" hangingPunct="1">
@@ -25002,7 +25023,7 @@
               <a:pPr>
                 <a:defRPr/>
               </a:pPr>
-              <a:t>1/13/2026</a:t>
+              <a:t>1/14/2026</a:t>
             </a:fld>
             <a:endParaRPr lang="en-US"/>
           </a:p>
@@ -25159,7 +25180,7 @@
               <a:pPr>
                 <a:defRPr/>
               </a:pPr>
-              <a:t>1/13/2026</a:t>
+              <a:t>1/14/2026</a:t>
             </a:fld>
             <a:endParaRPr lang="en-US"/>
           </a:p>
@@ -25326,7 +25347,7 @@
               <a:pPr>
                 <a:defRPr/>
               </a:pPr>
-              <a:t>1/13/2026</a:t>
+              <a:t>1/14/2026</a:t>
             </a:fld>
             <a:endParaRPr lang="en-US"/>
           </a:p>
@@ -25556,7 +25577,7 @@
               <a:pPr>
                 <a:defRPr/>
               </a:pPr>
-              <a:t>1/13/2026</a:t>
+              <a:t>1/14/2026</a:t>
             </a:fld>
             <a:endParaRPr lang="en-US"/>
           </a:p>
@@ -25723,7 +25744,7 @@
               <a:pPr>
                 <a:defRPr/>
               </a:pPr>
-              <a:t>1/13/2026</a:t>
+              <a:t>1/14/2026</a:t>
             </a:fld>
             <a:endParaRPr lang="en-US" dirty="0"/>
           </a:p>
@@ -25957,7 +25978,7 @@
               <a:pPr>
                 <a:defRPr/>
               </a:pPr>
-              <a:t>1/13/2026</a:t>
+              <a:t>1/14/2026</a:t>
             </a:fld>
             <a:endParaRPr lang="en-US"/>
           </a:p>
@@ -26231,7 +26252,7 @@
               <a:pPr>
                 <a:defRPr/>
               </a:pPr>
-              <a:t>1/13/2026</a:t>
+              <a:t>1/14/2026</a:t>
             </a:fld>
             <a:endParaRPr lang="en-US"/>
           </a:p>
@@ -26644,7 +26665,7 @@
               <a:pPr>
                 <a:defRPr/>
               </a:pPr>
-              <a:t>1/13/2026</a:t>
+              <a:t>1/14/2026</a:t>
             </a:fld>
             <a:endParaRPr lang="en-US"/>
           </a:p>
@@ -26750,7 +26771,7 @@
               <a:pPr>
                 <a:defRPr/>
               </a:pPr>
-              <a:t>1/13/2026</a:t>
+              <a:t>1/14/2026</a:t>
             </a:fld>
             <a:endParaRPr lang="en-US"/>
           </a:p>
@@ -26834,7 +26855,7 @@
               <a:pPr>
                 <a:defRPr/>
               </a:pPr>
-              <a:t>1/13/2026</a:t>
+              <a:t>1/14/2026</a:t>
             </a:fld>
             <a:endParaRPr lang="en-US"/>
           </a:p>
@@ -27098,7 +27119,7 @@
               <a:pPr>
                 <a:defRPr/>
               </a:pPr>
-              <a:t>1/13/2026</a:t>
+              <a:t>1/14/2026</a:t>
             </a:fld>
             <a:endParaRPr lang="en-US"/>
           </a:p>
@@ -27263,7 +27284,7 @@
               <a:pPr>
                 <a:defRPr/>
               </a:pPr>
-              <a:t>1/13/2026</a:t>
+              <a:t>1/14/2026</a:t>
             </a:fld>
             <a:endParaRPr lang="en-US" dirty="0"/>
           </a:p>
@@ -27510,7 +27531,7 @@
               <a:pPr>
                 <a:defRPr/>
               </a:pPr>
-              <a:t>1/13/2026</a:t>
+              <a:t>1/14/2026</a:t>
             </a:fld>
             <a:endParaRPr lang="en-US"/>
           </a:p>
@@ -27667,7 +27688,7 @@
               <a:pPr>
                 <a:defRPr/>
               </a:pPr>
-              <a:t>1/13/2026</a:t>
+              <a:t>1/14/2026</a:t>
             </a:fld>
             <a:endParaRPr lang="en-US"/>
           </a:p>
@@ -27834,7 +27855,7 @@
               <a:pPr>
                 <a:defRPr/>
               </a:pPr>
-              <a:t>1/13/2026</a:t>
+              <a:t>1/14/2026</a:t>
             </a:fld>
             <a:endParaRPr lang="en-US"/>
           </a:p>
@@ -28019,7 +28040,7 @@
               <a:pPr>
                 <a:defRPr/>
               </a:pPr>
-              <a:t>1/13/2026</a:t>
+              <a:t>1/14/2026</a:t>
             </a:fld>
             <a:endParaRPr lang="en-US"/>
           </a:p>
@@ -28240,7 +28261,7 @@
               <a:pPr>
                 <a:defRPr/>
               </a:pPr>
-              <a:t>1/13/2026</a:t>
+              <a:t>1/14/2026</a:t>
             </a:fld>
             <a:endParaRPr lang="en-US"/>
           </a:p>
@@ -28529,7 +28550,7 @@
               <a:pPr>
                 <a:defRPr/>
               </a:pPr>
-              <a:t>1/13/2026</a:t>
+              <a:t>1/14/2026</a:t>
             </a:fld>
             <a:endParaRPr lang="en-US"/>
           </a:p>
@@ -28807,7 +28828,7 @@
               <a:pPr>
                 <a:defRPr/>
               </a:pPr>
-              <a:t>1/13/2026</a:t>
+              <a:t>1/14/2026</a:t>
             </a:fld>
             <a:endParaRPr lang="en-US"/>
           </a:p>
@@ -29233,7 +29254,7 @@
               <a:pPr>
                 <a:defRPr/>
               </a:pPr>
-              <a:t>1/13/2026</a:t>
+              <a:t>1/14/2026</a:t>
             </a:fld>
             <a:endParaRPr lang="en-US"/>
           </a:p>
@@ -29392,7 +29413,7 @@
               <a:pPr>
                 <a:defRPr/>
               </a:pPr>
-              <a:t>1/13/2026</a:t>
+              <a:t>1/14/2026</a:t>
             </a:fld>
             <a:endParaRPr lang="en-US"/>
           </a:p>
@@ -29528,7 +29549,7 @@
               <a:pPr>
                 <a:defRPr/>
               </a:pPr>
-              <a:t>1/13/2026</a:t>
+              <a:t>1/14/2026</a:t>
             </a:fld>
             <a:endParaRPr lang="en-US"/>
           </a:p>
@@ -29787,7 +29808,7 @@
               <a:pPr>
                 <a:defRPr/>
               </a:pPr>
-              <a:t>1/13/2026</a:t>
+              <a:t>1/14/2026</a:t>
             </a:fld>
             <a:endParaRPr lang="en-US"/>
           </a:p>
@@ -30023,7 +30044,7 @@
               <a:pPr>
                 <a:defRPr/>
               </a:pPr>
-              <a:t>1/13/2026</a:t>
+              <a:t>1/14/2026</a:t>
             </a:fld>
             <a:endParaRPr lang="en-US"/>
           </a:p>
@@ -30478,7 +30499,7 @@
               <a:pPr>
                 <a:defRPr/>
               </a:pPr>
-              <a:t>1/13/2026</a:t>
+              <a:t>1/14/2026</a:t>
             </a:fld>
             <a:endParaRPr lang="en-US"/>
           </a:p>
@@ -30694,7 +30715,7 @@
               <a:pPr>
                 <a:defRPr/>
               </a:pPr>
-              <a:t>1/13/2026</a:t>
+              <a:t>1/14/2026</a:t>
             </a:fld>
             <a:endParaRPr lang="en-US"/>
           </a:p>
@@ -30919,7 +30940,7 @@
               <a:pPr>
                 <a:defRPr/>
               </a:pPr>
-              <a:t>1/13/2026</a:t>
+              <a:t>1/14/2026</a:t>
             </a:fld>
             <a:endParaRPr lang="en-US"/>
           </a:p>
@@ -31249,7 +31270,7 @@
               <a:pPr>
                 <a:defRPr/>
               </a:pPr>
-              <a:t>1/13/2026</a:t>
+              <a:t>1/14/2026</a:t>
             </a:fld>
             <a:endParaRPr lang="en-US"/>
           </a:p>
@@ -31662,7 +31683,7 @@
               <a:pPr>
                 <a:defRPr/>
               </a:pPr>
-              <a:t>1/13/2026</a:t>
+              <a:t>1/14/2026</a:t>
             </a:fld>
             <a:endParaRPr lang="en-US"/>
           </a:p>
@@ -31768,7 +31789,7 @@
               <a:pPr>
                 <a:defRPr/>
               </a:pPr>
-              <a:t>1/13/2026</a:t>
+              <a:t>1/14/2026</a:t>
             </a:fld>
             <a:endParaRPr lang="en-US"/>
           </a:p>
@@ -31852,7 +31873,7 @@
               <a:pPr>
                 <a:defRPr/>
               </a:pPr>
-              <a:t>1/13/2026</a:t>
+              <a:t>1/14/2026</a:t>
             </a:fld>
             <a:endParaRPr lang="en-US"/>
           </a:p>
@@ -32116,7 +32137,7 @@
               <a:pPr>
                 <a:defRPr/>
               </a:pPr>
-              <a:t>1/13/2026</a:t>
+              <a:t>1/14/2026</a:t>
             </a:fld>
             <a:endParaRPr lang="en-US"/>
           </a:p>
@@ -32360,7 +32381,7 @@
               <a:pPr>
                 <a:defRPr/>
               </a:pPr>
-              <a:t>1/13/2026</a:t>
+              <a:t>1/14/2026</a:t>
             </a:fld>
             <a:endParaRPr lang="en-US"/>
           </a:p>
@@ -32593,7 +32614,7 @@
               <a:pPr>
                 <a:defRPr/>
               </a:pPr>
-              <a:t>1/13/2026</a:t>
+              <a:t>1/14/2026</a:t>
             </a:fld>
             <a:endParaRPr lang="en-US"/>
           </a:p>
@@ -33272,7 +33293,7 @@
               <a:pPr>
                 <a:defRPr/>
               </a:pPr>
-              <a:t>1/13/2026</a:t>
+              <a:t>1/14/2026</a:t>
             </a:fld>
             <a:endParaRPr lang="en-US"/>
           </a:p>
@@ -33999,7 +34020,7 @@
               <a:pPr>
                 <a:defRPr/>
               </a:pPr>
-              <a:t>1/13/2026</a:t>
+              <a:t>1/14/2026</a:t>
             </a:fld>
             <a:endParaRPr lang="en-US"/>
           </a:p>
@@ -42876,7 +42897,7 @@
             <p:ph idx="1"/>
             <p:extLst>
               <p:ext uri="{D42A27DB-BD31-4B8C-83A1-F6EECF244321}">
-                <p14:modId xmlns:p14="http://schemas.microsoft.com/office/powerpoint/2010/main" val="1407451718"/>
+                <p14:modId xmlns:p14="http://schemas.microsoft.com/office/powerpoint/2010/main" val="3648594766"/>
               </p:ext>
             </p:extLst>
           </p:nvPr>

</xml_diff>